<commit_message>
Add the mysql into pptx. Add the MysqlData
</commit_message>
<xml_diff>
--- a/DatabaseStudy/MySQL.pptx
+++ b/DatabaseStudy/MySQL.pptx
@@ -4,9 +4,14 @@
   <p:sldMasterIdLst>
     <p:sldMasterId id="2147483648" r:id="rId1"/>
   </p:sldMasterIdLst>
+  <p:notesMasterIdLst>
+    <p:notesMasterId r:id="rId6"/>
+  </p:notesMasterIdLst>
   <p:sldIdLst>
     <p:sldId id="256" r:id="rId2"/>
     <p:sldId id="257" r:id="rId3"/>
+    <p:sldId id="258" r:id="rId4"/>
+    <p:sldId id="259" r:id="rId5"/>
   </p:sldIdLst>
   <p:sldSz cx="12192000" cy="6858000"/>
   <p:notesSz cx="6858000" cy="9144000"/>
@@ -105,7 +110,446 @@
       </a:defRPr>
     </a:lvl9pPr>
   </p:defaultTextStyle>
+  <p:extLst>
+    <p:ext uri="{EFAFB233-063F-42B5-8137-9DF3F51BA10A}">
+      <p15:sldGuideLst xmlns:p15="http://schemas.microsoft.com/office/powerpoint/2012/main"/>
+    </p:ext>
+  </p:extLst>
 </p:presentation>
+</file>
+
+<file path=ppt/notesMasters/notesMaster1.xml><?xml version="1.0" encoding="utf-8"?>
+<p:notesMaster xmlns:a="http://schemas.openxmlformats.org/drawingml/2006/main" xmlns:r="http://schemas.openxmlformats.org/officeDocument/2006/relationships" xmlns:p="http://schemas.openxmlformats.org/presentationml/2006/main">
+  <p:cSld>
+    <p:bg>
+      <p:bgRef idx="1001">
+        <a:schemeClr val="bg1"/>
+      </p:bgRef>
+    </p:bg>
+    <p:spTree>
+      <p:nvGrpSpPr>
+        <p:cNvPr id="1" name=""/>
+        <p:cNvGrpSpPr/>
+        <p:nvPr/>
+      </p:nvGrpSpPr>
+      <p:grpSpPr>
+        <a:xfrm>
+          <a:off x="0" y="0"/>
+          <a:ext cx="0" cy="0"/>
+          <a:chOff x="0" y="0"/>
+          <a:chExt cx="0" cy="0"/>
+        </a:xfrm>
+      </p:grpSpPr>
+      <p:sp>
+        <p:nvSpPr>
+          <p:cNvPr id="2" name="页眉占位符 1"/>
+          <p:cNvSpPr>
+            <a:spLocks noGrp="1"/>
+          </p:cNvSpPr>
+          <p:nvPr>
+            <p:ph type="hdr" sz="quarter"/>
+          </p:nvPr>
+        </p:nvSpPr>
+        <p:spPr>
+          <a:xfrm>
+            <a:off x="0" y="0"/>
+            <a:ext cx="2971800" cy="458788"/>
+          </a:xfrm>
+          <a:prstGeom prst="rect">
+            <a:avLst/>
+          </a:prstGeom>
+        </p:spPr>
+        <p:txBody>
+          <a:bodyPr vert="horz" lIns="91440" tIns="45720" rIns="91440" bIns="45720" rtlCol="0"/>
+          <a:lstStyle>
+            <a:lvl1pPr algn="l">
+              <a:defRPr sz="1200"/>
+            </a:lvl1pPr>
+          </a:lstStyle>
+          <a:p>
+            <a:endParaRPr lang="zh-CN" altLang="en-US"/>
+          </a:p>
+        </p:txBody>
+      </p:sp>
+      <p:sp>
+        <p:nvSpPr>
+          <p:cNvPr id="3" name="日期占位符 2"/>
+          <p:cNvSpPr>
+            <a:spLocks noGrp="1"/>
+          </p:cNvSpPr>
+          <p:nvPr>
+            <p:ph type="dt" idx="1"/>
+          </p:nvPr>
+        </p:nvSpPr>
+        <p:spPr>
+          <a:xfrm>
+            <a:off x="3884613" y="0"/>
+            <a:ext cx="2971800" cy="458788"/>
+          </a:xfrm>
+          <a:prstGeom prst="rect">
+            <a:avLst/>
+          </a:prstGeom>
+        </p:spPr>
+        <p:txBody>
+          <a:bodyPr vert="horz" lIns="91440" tIns="45720" rIns="91440" bIns="45720" rtlCol="0"/>
+          <a:lstStyle>
+            <a:lvl1pPr algn="r">
+              <a:defRPr sz="1200"/>
+            </a:lvl1pPr>
+          </a:lstStyle>
+          <a:p>
+            <a:fld id="{B42E79CA-CEA4-4216-B58F-668E25AE62E4}" type="datetimeFigureOut">
+              <a:rPr lang="zh-CN" altLang="en-US" smtClean="0"/>
+              <a:t>2023/2/16</a:t>
+            </a:fld>
+            <a:endParaRPr lang="zh-CN" altLang="en-US"/>
+          </a:p>
+        </p:txBody>
+      </p:sp>
+      <p:sp>
+        <p:nvSpPr>
+          <p:cNvPr id="4" name="幻灯片图像占位符 3"/>
+          <p:cNvSpPr>
+            <a:spLocks noGrp="1" noRot="1" noChangeAspect="1"/>
+          </p:cNvSpPr>
+          <p:nvPr>
+            <p:ph type="sldImg" idx="2"/>
+          </p:nvPr>
+        </p:nvSpPr>
+        <p:spPr>
+          <a:xfrm>
+            <a:off x="685800" y="1143000"/>
+            <a:ext cx="5486400" cy="3086100"/>
+          </a:xfrm>
+          <a:prstGeom prst="rect">
+            <a:avLst/>
+          </a:prstGeom>
+          <a:noFill/>
+          <a:ln w="12700">
+            <a:solidFill>
+              <a:prstClr val="black"/>
+            </a:solidFill>
+          </a:ln>
+        </p:spPr>
+        <p:txBody>
+          <a:bodyPr vert="horz" lIns="91440" tIns="45720" rIns="91440" bIns="45720" rtlCol="0" anchor="ctr"/>
+          <a:lstStyle/>
+          <a:p>
+            <a:endParaRPr lang="zh-CN" altLang="en-US"/>
+          </a:p>
+        </p:txBody>
+      </p:sp>
+      <p:sp>
+        <p:nvSpPr>
+          <p:cNvPr id="5" name="备注占位符 4"/>
+          <p:cNvSpPr>
+            <a:spLocks noGrp="1"/>
+          </p:cNvSpPr>
+          <p:nvPr>
+            <p:ph type="body" sz="quarter" idx="3"/>
+          </p:nvPr>
+        </p:nvSpPr>
+        <p:spPr>
+          <a:xfrm>
+            <a:off x="685800" y="4400550"/>
+            <a:ext cx="5486400" cy="3600450"/>
+          </a:xfrm>
+          <a:prstGeom prst="rect">
+            <a:avLst/>
+          </a:prstGeom>
+        </p:spPr>
+        <p:txBody>
+          <a:bodyPr vert="horz" lIns="91440" tIns="45720" rIns="91440" bIns="45720" rtlCol="0"/>
+          <a:lstStyle/>
+          <a:p>
+            <a:pPr lvl="0"/>
+            <a:r>
+              <a:rPr lang="zh-CN" altLang="en-US" smtClean="0"/>
+              <a:t>编辑母版文本样式</a:t>
+            </a:r>
+          </a:p>
+          <a:p>
+            <a:pPr lvl="1"/>
+            <a:r>
+              <a:rPr lang="zh-CN" altLang="en-US" smtClean="0"/>
+              <a:t>第二级</a:t>
+            </a:r>
+          </a:p>
+          <a:p>
+            <a:pPr lvl="2"/>
+            <a:r>
+              <a:rPr lang="zh-CN" altLang="en-US" smtClean="0"/>
+              <a:t>第三级</a:t>
+            </a:r>
+          </a:p>
+          <a:p>
+            <a:pPr lvl="3"/>
+            <a:r>
+              <a:rPr lang="zh-CN" altLang="en-US" smtClean="0"/>
+              <a:t>第四级</a:t>
+            </a:r>
+          </a:p>
+          <a:p>
+            <a:pPr lvl="4"/>
+            <a:r>
+              <a:rPr lang="zh-CN" altLang="en-US" smtClean="0"/>
+              <a:t>第五级</a:t>
+            </a:r>
+            <a:endParaRPr lang="zh-CN" altLang="en-US"/>
+          </a:p>
+        </p:txBody>
+      </p:sp>
+      <p:sp>
+        <p:nvSpPr>
+          <p:cNvPr id="6" name="页脚占位符 5"/>
+          <p:cNvSpPr>
+            <a:spLocks noGrp="1"/>
+          </p:cNvSpPr>
+          <p:nvPr>
+            <p:ph type="ftr" sz="quarter" idx="4"/>
+          </p:nvPr>
+        </p:nvSpPr>
+        <p:spPr>
+          <a:xfrm>
+            <a:off x="0" y="8685213"/>
+            <a:ext cx="2971800" cy="458787"/>
+          </a:xfrm>
+          <a:prstGeom prst="rect">
+            <a:avLst/>
+          </a:prstGeom>
+        </p:spPr>
+        <p:txBody>
+          <a:bodyPr vert="horz" lIns="91440" tIns="45720" rIns="91440" bIns="45720" rtlCol="0" anchor="b"/>
+          <a:lstStyle>
+            <a:lvl1pPr algn="l">
+              <a:defRPr sz="1200"/>
+            </a:lvl1pPr>
+          </a:lstStyle>
+          <a:p>
+            <a:endParaRPr lang="zh-CN" altLang="en-US"/>
+          </a:p>
+        </p:txBody>
+      </p:sp>
+      <p:sp>
+        <p:nvSpPr>
+          <p:cNvPr id="7" name="灯片编号占位符 6"/>
+          <p:cNvSpPr>
+            <a:spLocks noGrp="1"/>
+          </p:cNvSpPr>
+          <p:nvPr>
+            <p:ph type="sldNum" sz="quarter" idx="5"/>
+          </p:nvPr>
+        </p:nvSpPr>
+        <p:spPr>
+          <a:xfrm>
+            <a:off x="3884613" y="8685213"/>
+            <a:ext cx="2971800" cy="458787"/>
+          </a:xfrm>
+          <a:prstGeom prst="rect">
+            <a:avLst/>
+          </a:prstGeom>
+        </p:spPr>
+        <p:txBody>
+          <a:bodyPr vert="horz" lIns="91440" tIns="45720" rIns="91440" bIns="45720" rtlCol="0" anchor="b"/>
+          <a:lstStyle>
+            <a:lvl1pPr algn="r">
+              <a:defRPr sz="1200"/>
+            </a:lvl1pPr>
+          </a:lstStyle>
+          <a:p>
+            <a:fld id="{5BF7EF1A-20FF-43CE-BBB0-B76969712B13}" type="slidenum">
+              <a:rPr lang="zh-CN" altLang="en-US" smtClean="0"/>
+              <a:t>‹#›</a:t>
+            </a:fld>
+            <a:endParaRPr lang="zh-CN" altLang="en-US"/>
+          </a:p>
+        </p:txBody>
+      </p:sp>
+    </p:spTree>
+    <p:extLst>
+      <p:ext uri="{BB962C8B-B14F-4D97-AF65-F5344CB8AC3E}">
+        <p14:creationId xmlns:p14="http://schemas.microsoft.com/office/powerpoint/2010/main" val="947824428"/>
+      </p:ext>
+    </p:extLst>
+  </p:cSld>
+  <p:clrMap bg1="lt1" tx1="dk1" bg2="lt2" tx2="dk2" accent1="accent1" accent2="accent2" accent3="accent3" accent4="accent4" accent5="accent5" accent6="accent6" hlink="hlink" folHlink="folHlink"/>
+  <p:notesStyle>
+    <a:lvl1pPr marL="0" algn="l" defTabSz="914400" rtl="0" eaLnBrk="1" latinLnBrk="0" hangingPunct="1">
+      <a:defRPr sz="1200" kern="1200">
+        <a:solidFill>
+          <a:schemeClr val="tx1"/>
+        </a:solidFill>
+        <a:latin typeface="+mn-lt"/>
+        <a:ea typeface="+mn-ea"/>
+        <a:cs typeface="+mn-cs"/>
+      </a:defRPr>
+    </a:lvl1pPr>
+    <a:lvl2pPr marL="457200" algn="l" defTabSz="914400" rtl="0" eaLnBrk="1" latinLnBrk="0" hangingPunct="1">
+      <a:defRPr sz="1200" kern="1200">
+        <a:solidFill>
+          <a:schemeClr val="tx1"/>
+        </a:solidFill>
+        <a:latin typeface="+mn-lt"/>
+        <a:ea typeface="+mn-ea"/>
+        <a:cs typeface="+mn-cs"/>
+      </a:defRPr>
+    </a:lvl2pPr>
+    <a:lvl3pPr marL="914400" algn="l" defTabSz="914400" rtl="0" eaLnBrk="1" latinLnBrk="0" hangingPunct="1">
+      <a:defRPr sz="1200" kern="1200">
+        <a:solidFill>
+          <a:schemeClr val="tx1"/>
+        </a:solidFill>
+        <a:latin typeface="+mn-lt"/>
+        <a:ea typeface="+mn-ea"/>
+        <a:cs typeface="+mn-cs"/>
+      </a:defRPr>
+    </a:lvl3pPr>
+    <a:lvl4pPr marL="1371600" algn="l" defTabSz="914400" rtl="0" eaLnBrk="1" latinLnBrk="0" hangingPunct="1">
+      <a:defRPr sz="1200" kern="1200">
+        <a:solidFill>
+          <a:schemeClr val="tx1"/>
+        </a:solidFill>
+        <a:latin typeface="+mn-lt"/>
+        <a:ea typeface="+mn-ea"/>
+        <a:cs typeface="+mn-cs"/>
+      </a:defRPr>
+    </a:lvl4pPr>
+    <a:lvl5pPr marL="1828800" algn="l" defTabSz="914400" rtl="0" eaLnBrk="1" latinLnBrk="0" hangingPunct="1">
+      <a:defRPr sz="1200" kern="1200">
+        <a:solidFill>
+          <a:schemeClr val="tx1"/>
+        </a:solidFill>
+        <a:latin typeface="+mn-lt"/>
+        <a:ea typeface="+mn-ea"/>
+        <a:cs typeface="+mn-cs"/>
+      </a:defRPr>
+    </a:lvl5pPr>
+    <a:lvl6pPr marL="2286000" algn="l" defTabSz="914400" rtl="0" eaLnBrk="1" latinLnBrk="0" hangingPunct="1">
+      <a:defRPr sz="1200" kern="1200">
+        <a:solidFill>
+          <a:schemeClr val="tx1"/>
+        </a:solidFill>
+        <a:latin typeface="+mn-lt"/>
+        <a:ea typeface="+mn-ea"/>
+        <a:cs typeface="+mn-cs"/>
+      </a:defRPr>
+    </a:lvl6pPr>
+    <a:lvl7pPr marL="2743200" algn="l" defTabSz="914400" rtl="0" eaLnBrk="1" latinLnBrk="0" hangingPunct="1">
+      <a:defRPr sz="1200" kern="1200">
+        <a:solidFill>
+          <a:schemeClr val="tx1"/>
+        </a:solidFill>
+        <a:latin typeface="+mn-lt"/>
+        <a:ea typeface="+mn-ea"/>
+        <a:cs typeface="+mn-cs"/>
+      </a:defRPr>
+    </a:lvl7pPr>
+    <a:lvl8pPr marL="3200400" algn="l" defTabSz="914400" rtl="0" eaLnBrk="1" latinLnBrk="0" hangingPunct="1">
+      <a:defRPr sz="1200" kern="1200">
+        <a:solidFill>
+          <a:schemeClr val="tx1"/>
+        </a:solidFill>
+        <a:latin typeface="+mn-lt"/>
+        <a:ea typeface="+mn-ea"/>
+        <a:cs typeface="+mn-cs"/>
+      </a:defRPr>
+    </a:lvl8pPr>
+    <a:lvl9pPr marL="3657600" algn="l" defTabSz="914400" rtl="0" eaLnBrk="1" latinLnBrk="0" hangingPunct="1">
+      <a:defRPr sz="1200" kern="1200">
+        <a:solidFill>
+          <a:schemeClr val="tx1"/>
+        </a:solidFill>
+        <a:latin typeface="+mn-lt"/>
+        <a:ea typeface="+mn-ea"/>
+        <a:cs typeface="+mn-cs"/>
+      </a:defRPr>
+    </a:lvl9pPr>
+  </p:notesStyle>
+</p:notesMaster>
+</file>
+
+<file path=ppt/notesSlides/notesSlide1.xml><?xml version="1.0" encoding="utf-8"?>
+<p:notes xmlns:a="http://schemas.openxmlformats.org/drawingml/2006/main" xmlns:r="http://schemas.openxmlformats.org/officeDocument/2006/relationships" xmlns:p="http://schemas.openxmlformats.org/presentationml/2006/main">
+  <p:cSld>
+    <p:spTree>
+      <p:nvGrpSpPr>
+        <p:cNvPr id="1" name=""/>
+        <p:cNvGrpSpPr/>
+        <p:nvPr/>
+      </p:nvGrpSpPr>
+      <p:grpSpPr>
+        <a:xfrm>
+          <a:off x="0" y="0"/>
+          <a:ext cx="0" cy="0"/>
+          <a:chOff x="0" y="0"/>
+          <a:chExt cx="0" cy="0"/>
+        </a:xfrm>
+      </p:grpSpPr>
+      <p:sp>
+        <p:nvSpPr>
+          <p:cNvPr id="2" name="幻灯片图像占位符 1"/>
+          <p:cNvSpPr>
+            <a:spLocks noGrp="1" noRot="1" noChangeAspect="1"/>
+          </p:cNvSpPr>
+          <p:nvPr>
+            <p:ph type="sldImg"/>
+          </p:nvPr>
+        </p:nvSpPr>
+        <p:spPr/>
+      </p:sp>
+      <p:sp>
+        <p:nvSpPr>
+          <p:cNvPr id="3" name="备注占位符 2"/>
+          <p:cNvSpPr>
+            <a:spLocks noGrp="1"/>
+          </p:cNvSpPr>
+          <p:nvPr>
+            <p:ph type="body" idx="1"/>
+          </p:nvPr>
+        </p:nvSpPr>
+        <p:spPr/>
+        <p:txBody>
+          <a:bodyPr/>
+          <a:lstStyle/>
+          <a:p>
+            <a:endParaRPr lang="zh-CN" altLang="en-US" dirty="0"/>
+          </a:p>
+        </p:txBody>
+      </p:sp>
+      <p:sp>
+        <p:nvSpPr>
+          <p:cNvPr id="4" name="灯片编号占位符 3"/>
+          <p:cNvSpPr>
+            <a:spLocks noGrp="1"/>
+          </p:cNvSpPr>
+          <p:nvPr>
+            <p:ph type="sldNum" sz="quarter" idx="10"/>
+          </p:nvPr>
+        </p:nvSpPr>
+        <p:spPr/>
+        <p:txBody>
+          <a:bodyPr/>
+          <a:lstStyle/>
+          <a:p>
+            <a:fld id="{5BF7EF1A-20FF-43CE-BBB0-B76969712B13}" type="slidenum">
+              <a:rPr lang="zh-CN" altLang="en-US" smtClean="0"/>
+              <a:t>4</a:t>
+            </a:fld>
+            <a:endParaRPr lang="zh-CN" altLang="en-US"/>
+          </a:p>
+        </p:txBody>
+      </p:sp>
+    </p:spTree>
+    <p:extLst>
+      <p:ext uri="{BB962C8B-B14F-4D97-AF65-F5344CB8AC3E}">
+        <p14:creationId xmlns:p14="http://schemas.microsoft.com/office/powerpoint/2010/main" val="1862038340"/>
+      </p:ext>
+    </p:extLst>
+  </p:cSld>
+  <p:clrMapOvr>
+    <a:masterClrMapping/>
+  </p:clrMapOvr>
+</p:notes>
 </file>
 
 <file path=ppt/slideLayouts/slideLayout1.xml><?xml version="1.0" encoding="utf-8"?>
@@ -255,7 +699,7 @@
           <a:p>
             <a:fld id="{11173057-E3FB-4AE4-9370-CCC1CF2B6FF4}" type="datetimeFigureOut">
               <a:rPr lang="zh-TW" altLang="en-US" smtClean="0"/>
-              <a:t>2023/2/15</a:t>
+              <a:t>2023/2/16</a:t>
             </a:fld>
             <a:endParaRPr lang="zh-TW" altLang="en-US"/>
           </a:p>
@@ -453,7 +897,7 @@
           <a:p>
             <a:fld id="{11173057-E3FB-4AE4-9370-CCC1CF2B6FF4}" type="datetimeFigureOut">
               <a:rPr lang="zh-TW" altLang="en-US" smtClean="0"/>
-              <a:t>2023/2/15</a:t>
+              <a:t>2023/2/16</a:t>
             </a:fld>
             <a:endParaRPr lang="zh-TW" altLang="en-US"/>
           </a:p>
@@ -661,7 +1105,7 @@
           <a:p>
             <a:fld id="{11173057-E3FB-4AE4-9370-CCC1CF2B6FF4}" type="datetimeFigureOut">
               <a:rPr lang="zh-TW" altLang="en-US" smtClean="0"/>
-              <a:t>2023/2/15</a:t>
+              <a:t>2023/2/16</a:t>
             </a:fld>
             <a:endParaRPr lang="zh-TW" altLang="en-US"/>
           </a:p>
@@ -859,7 +1303,7 @@
           <a:p>
             <a:fld id="{11173057-E3FB-4AE4-9370-CCC1CF2B6FF4}" type="datetimeFigureOut">
               <a:rPr lang="zh-TW" altLang="en-US" smtClean="0"/>
-              <a:t>2023/2/15</a:t>
+              <a:t>2023/2/16</a:t>
             </a:fld>
             <a:endParaRPr lang="zh-TW" altLang="en-US"/>
           </a:p>
@@ -1134,7 +1578,7 @@
           <a:p>
             <a:fld id="{11173057-E3FB-4AE4-9370-CCC1CF2B6FF4}" type="datetimeFigureOut">
               <a:rPr lang="zh-TW" altLang="en-US" smtClean="0"/>
-              <a:t>2023/2/15</a:t>
+              <a:t>2023/2/16</a:t>
             </a:fld>
             <a:endParaRPr lang="zh-TW" altLang="en-US"/>
           </a:p>
@@ -1399,7 +1843,7 @@
           <a:p>
             <a:fld id="{11173057-E3FB-4AE4-9370-CCC1CF2B6FF4}" type="datetimeFigureOut">
               <a:rPr lang="zh-TW" altLang="en-US" smtClean="0"/>
-              <a:t>2023/2/15</a:t>
+              <a:t>2023/2/16</a:t>
             </a:fld>
             <a:endParaRPr lang="zh-TW" altLang="en-US"/>
           </a:p>
@@ -1811,7 +2255,7 @@
           <a:p>
             <a:fld id="{11173057-E3FB-4AE4-9370-CCC1CF2B6FF4}" type="datetimeFigureOut">
               <a:rPr lang="zh-TW" altLang="en-US" smtClean="0"/>
-              <a:t>2023/2/15</a:t>
+              <a:t>2023/2/16</a:t>
             </a:fld>
             <a:endParaRPr lang="zh-TW" altLang="en-US"/>
           </a:p>
@@ -1952,7 +2396,7 @@
           <a:p>
             <a:fld id="{11173057-E3FB-4AE4-9370-CCC1CF2B6FF4}" type="datetimeFigureOut">
               <a:rPr lang="zh-TW" altLang="en-US" smtClean="0"/>
-              <a:t>2023/2/15</a:t>
+              <a:t>2023/2/16</a:t>
             </a:fld>
             <a:endParaRPr lang="zh-TW" altLang="en-US"/>
           </a:p>
@@ -2065,7 +2509,7 @@
           <a:p>
             <a:fld id="{11173057-E3FB-4AE4-9370-CCC1CF2B6FF4}" type="datetimeFigureOut">
               <a:rPr lang="zh-TW" altLang="en-US" smtClean="0"/>
-              <a:t>2023/2/15</a:t>
+              <a:t>2023/2/16</a:t>
             </a:fld>
             <a:endParaRPr lang="zh-TW" altLang="en-US"/>
           </a:p>
@@ -2376,7 +2820,7 @@
           <a:p>
             <a:fld id="{11173057-E3FB-4AE4-9370-CCC1CF2B6FF4}" type="datetimeFigureOut">
               <a:rPr lang="zh-TW" altLang="en-US" smtClean="0"/>
-              <a:t>2023/2/15</a:t>
+              <a:t>2023/2/16</a:t>
             </a:fld>
             <a:endParaRPr lang="zh-TW" altLang="en-US"/>
           </a:p>
@@ -2664,7 +3108,7 @@
           <a:p>
             <a:fld id="{11173057-E3FB-4AE4-9370-CCC1CF2B6FF4}" type="datetimeFigureOut">
               <a:rPr lang="zh-TW" altLang="en-US" smtClean="0"/>
-              <a:t>2023/2/15</a:t>
+              <a:t>2023/2/16</a:t>
             </a:fld>
             <a:endParaRPr lang="zh-TW" altLang="en-US"/>
           </a:p>
@@ -2905,7 +3349,7 @@
           <a:p>
             <a:fld id="{11173057-E3FB-4AE4-9370-CCC1CF2B6FF4}" type="datetimeFigureOut">
               <a:rPr lang="zh-TW" altLang="en-US" smtClean="0"/>
-              <a:t>2023/2/15</a:t>
+              <a:t>2023/2/16</a:t>
             </a:fld>
             <a:endParaRPr lang="zh-TW" altLang="en-US"/>
           </a:p>
@@ -3528,6 +3972,290 @@
 </p:sld>
 </file>
 
+<file path=ppt/slides/slide3.xml><?xml version="1.0" encoding="utf-8"?>
+<p:sld xmlns:a="http://schemas.openxmlformats.org/drawingml/2006/main" xmlns:r="http://schemas.openxmlformats.org/officeDocument/2006/relationships" xmlns:p="http://schemas.openxmlformats.org/presentationml/2006/main">
+  <p:cSld>
+    <p:spTree>
+      <p:nvGrpSpPr>
+        <p:cNvPr id="1" name=""/>
+        <p:cNvGrpSpPr/>
+        <p:nvPr/>
+      </p:nvGrpSpPr>
+      <p:grpSpPr>
+        <a:xfrm>
+          <a:off x="0" y="0"/>
+          <a:ext cx="0" cy="0"/>
+          <a:chOff x="0" y="0"/>
+          <a:chExt cx="0" cy="0"/>
+        </a:xfrm>
+      </p:grpSpPr>
+      <p:sp>
+        <p:nvSpPr>
+          <p:cNvPr id="3" name="文本框 2"/>
+          <p:cNvSpPr txBox="1"/>
+          <p:nvPr/>
+        </p:nvSpPr>
+        <p:spPr>
+          <a:xfrm>
+            <a:off x="360218" y="263236"/>
+            <a:ext cx="1569660" cy="369332"/>
+          </a:xfrm>
+          <a:prstGeom prst="rect">
+            <a:avLst/>
+          </a:prstGeom>
+          <a:noFill/>
+        </p:spPr>
+        <p:txBody>
+          <a:bodyPr wrap="none" rtlCol="0">
+            <a:spAutoFit/>
+          </a:bodyPr>
+          <a:lstStyle/>
+          <a:p>
+            <a:r>
+              <a:rPr lang="zh-CN" altLang="en-US" b="1" u="sng" dirty="0" smtClean="0"/>
+              <a:t>一些特殊符号</a:t>
+            </a:r>
+            <a:endParaRPr lang="zh-CN" altLang="en-US" b="1" u="sng" dirty="0"/>
+          </a:p>
+        </p:txBody>
+      </p:sp>
+      <p:sp>
+        <p:nvSpPr>
+          <p:cNvPr id="4" name="文本框 3"/>
+          <p:cNvSpPr txBox="1"/>
+          <p:nvPr/>
+        </p:nvSpPr>
+        <p:spPr>
+          <a:xfrm>
+            <a:off x="886691" y="1108364"/>
+            <a:ext cx="2694969" cy="369332"/>
+          </a:xfrm>
+          <a:prstGeom prst="rect">
+            <a:avLst/>
+          </a:prstGeom>
+          <a:noFill/>
+        </p:spPr>
+        <p:txBody>
+          <a:bodyPr wrap="none" rtlCol="0">
+            <a:spAutoFit/>
+          </a:bodyPr>
+          <a:lstStyle/>
+          <a:p>
+            <a:r>
+              <a:rPr lang="en-US" altLang="zh-CN" dirty="0" smtClean="0"/>
+              <a:t>\c    </a:t>
+            </a:r>
+            <a:r>
+              <a:rPr lang="zh-CN" altLang="en-US" dirty="0" smtClean="0"/>
+              <a:t>可以停止输入</a:t>
+            </a:r>
+            <a:r>
+              <a:rPr lang="en-US" altLang="zh-CN" dirty="0" err="1" smtClean="0"/>
+              <a:t>sql</a:t>
+            </a:r>
+            <a:r>
+              <a:rPr lang="zh-CN" altLang="en-US" dirty="0" smtClean="0"/>
+              <a:t>语句</a:t>
+            </a:r>
+            <a:endParaRPr lang="zh-CN" altLang="en-US" dirty="0"/>
+          </a:p>
+        </p:txBody>
+      </p:sp>
+    </p:spTree>
+    <p:extLst>
+      <p:ext uri="{BB962C8B-B14F-4D97-AF65-F5344CB8AC3E}">
+        <p14:creationId xmlns:p14="http://schemas.microsoft.com/office/powerpoint/2010/main" val="1705018791"/>
+      </p:ext>
+    </p:extLst>
+  </p:cSld>
+  <p:clrMapOvr>
+    <a:masterClrMapping/>
+  </p:clrMapOvr>
+</p:sld>
+</file>
+
+<file path=ppt/slides/slide4.xml><?xml version="1.0" encoding="utf-8"?>
+<p:sld xmlns:a="http://schemas.openxmlformats.org/drawingml/2006/main" xmlns:r="http://schemas.openxmlformats.org/officeDocument/2006/relationships" xmlns:p="http://schemas.openxmlformats.org/presentationml/2006/main">
+  <p:cSld>
+    <p:spTree>
+      <p:nvGrpSpPr>
+        <p:cNvPr id="1" name=""/>
+        <p:cNvGrpSpPr/>
+        <p:nvPr/>
+      </p:nvGrpSpPr>
+      <p:grpSpPr>
+        <a:xfrm>
+          <a:off x="0" y="0"/>
+          <a:ext cx="0" cy="0"/>
+          <a:chOff x="0" y="0"/>
+          <a:chExt cx="0" cy="0"/>
+        </a:xfrm>
+      </p:grpSpPr>
+      <p:sp>
+        <p:nvSpPr>
+          <p:cNvPr id="4" name="文本框 3"/>
+          <p:cNvSpPr txBox="1"/>
+          <p:nvPr/>
+        </p:nvSpPr>
+        <p:spPr>
+          <a:xfrm>
+            <a:off x="318655" y="263236"/>
+            <a:ext cx="7653890" cy="2031325"/>
+          </a:xfrm>
+          <a:prstGeom prst="rect">
+            <a:avLst/>
+          </a:prstGeom>
+          <a:noFill/>
+        </p:spPr>
+        <p:txBody>
+          <a:bodyPr wrap="none" rtlCol="0">
+            <a:spAutoFit/>
+          </a:bodyPr>
+          <a:lstStyle/>
+          <a:p>
+            <a:r>
+              <a:rPr lang="zh-CN" altLang="en-US" b="1" u="sng" dirty="0" smtClean="0"/>
+              <a:t>数据库操作语句语句</a:t>
+            </a:r>
+            <a:endParaRPr lang="en-US" altLang="zh-CN" b="1" u="sng" dirty="0" smtClean="0"/>
+          </a:p>
+          <a:p>
+            <a:endParaRPr lang="en-US" altLang="zh-CN" dirty="0"/>
+          </a:p>
+          <a:p>
+            <a:r>
+              <a:rPr lang="en-US" altLang="zh-CN" dirty="0" smtClean="0"/>
+              <a:t>	1.   select user();      ---  </a:t>
+            </a:r>
+            <a:r>
+              <a:rPr lang="zh-CN" altLang="en-US" dirty="0" smtClean="0"/>
+              <a:t>查询当前用户</a:t>
+            </a:r>
+            <a:endParaRPr lang="en-US" altLang="zh-CN" dirty="0" smtClean="0"/>
+          </a:p>
+          <a:p>
+            <a:r>
+              <a:rPr lang="en-US" altLang="zh-CN" dirty="0"/>
+              <a:t>	</a:t>
+            </a:r>
+            <a:r>
+              <a:rPr lang="en-US" altLang="zh-CN" dirty="0" smtClean="0"/>
+              <a:t>2.   select database();   --- </a:t>
+            </a:r>
+            <a:r>
+              <a:rPr lang="zh-CN" altLang="en-US" dirty="0" smtClean="0"/>
+              <a:t>查询当前数据库</a:t>
+            </a:r>
+            <a:endParaRPr lang="en-US" altLang="zh-CN" dirty="0" smtClean="0"/>
+          </a:p>
+          <a:p>
+            <a:r>
+              <a:rPr lang="en-US" altLang="zh-CN" dirty="0"/>
+              <a:t>	</a:t>
+            </a:r>
+            <a:r>
+              <a:rPr lang="en-US" altLang="zh-CN" dirty="0" smtClean="0"/>
+              <a:t>3.   create database + </a:t>
+            </a:r>
+            <a:r>
+              <a:rPr lang="zh-CN" altLang="en-US" dirty="0" smtClean="0"/>
+              <a:t>数据库名字 </a:t>
+            </a:r>
+            <a:r>
+              <a:rPr lang="en-US" altLang="zh-CN" dirty="0" smtClean="0"/>
+              <a:t>--- </a:t>
+            </a:r>
+            <a:r>
+              <a:rPr lang="zh-CN" altLang="en-US" dirty="0" smtClean="0"/>
+              <a:t>创建</a:t>
+            </a:r>
+            <a:r>
+              <a:rPr lang="zh-CN" altLang="en-US" dirty="0"/>
+              <a:t>一</a:t>
+            </a:r>
+            <a:r>
+              <a:rPr lang="zh-CN" altLang="en-US" dirty="0" smtClean="0"/>
+              <a:t>个数据库</a:t>
+            </a:r>
+            <a:endParaRPr lang="en-US" altLang="zh-CN" dirty="0" smtClean="0"/>
+          </a:p>
+          <a:p>
+            <a:r>
+              <a:rPr lang="en-US" altLang="zh-CN" dirty="0"/>
+              <a:t>	</a:t>
+            </a:r>
+            <a:r>
+              <a:rPr lang="en-US" altLang="zh-CN" dirty="0" smtClean="0"/>
+              <a:t>4</a:t>
+            </a:r>
+            <a:r>
+              <a:rPr lang="en-US" altLang="zh-CN" dirty="0"/>
+              <a:t>. </a:t>
+            </a:r>
+            <a:r>
+              <a:rPr lang="en-US" altLang="zh-CN" dirty="0" smtClean="0"/>
+              <a:t> </a:t>
+            </a:r>
+            <a:r>
+              <a:rPr lang="en-US" altLang="zh-CN" dirty="0" err="1" smtClean="0"/>
+              <a:t>mysql</a:t>
+            </a:r>
+            <a:r>
+              <a:rPr lang="en-US" altLang="zh-CN" dirty="0" smtClean="0"/>
+              <a:t> </a:t>
+            </a:r>
+            <a:r>
+              <a:rPr lang="en-US" altLang="zh-CN" dirty="0"/>
+              <a:t>-</a:t>
+            </a:r>
+            <a:r>
+              <a:rPr lang="en-US" altLang="zh-CN" dirty="0" err="1"/>
+              <a:t>uroot</a:t>
+            </a:r>
+            <a:r>
+              <a:rPr lang="en-US" altLang="zh-CN" dirty="0"/>
+              <a:t> -p </a:t>
+            </a:r>
+            <a:r>
+              <a:rPr lang="en-US" altLang="zh-CN" dirty="0" err="1" smtClean="0"/>
+              <a:t>testsql</a:t>
+            </a:r>
+            <a:r>
+              <a:rPr lang="en-US" altLang="zh-CN" dirty="0" smtClean="0"/>
+              <a:t>  --- </a:t>
+            </a:r>
+            <a:r>
+              <a:rPr lang="zh-CN" altLang="en-US" dirty="0" smtClean="0"/>
+              <a:t>指定数据库登录不需要再使用</a:t>
+            </a:r>
+            <a:r>
+              <a:rPr lang="en-US" altLang="zh-CN" dirty="0" smtClean="0"/>
+              <a:t>use</a:t>
+            </a:r>
+            <a:r>
+              <a:rPr lang="zh-CN" altLang="en-US" dirty="0" smtClean="0"/>
+              <a:t>语句</a:t>
+            </a:r>
+            <a:endParaRPr lang="en-US" altLang="zh-CN" dirty="0" smtClean="0"/>
+          </a:p>
+          <a:p>
+            <a:endParaRPr lang="en-US" altLang="zh-CN" dirty="0" smtClean="0"/>
+          </a:p>
+        </p:txBody>
+      </p:sp>
+    </p:spTree>
+    <p:extLst>
+      <p:ext uri="{BB962C8B-B14F-4D97-AF65-F5344CB8AC3E}">
+        <p14:creationId xmlns:p14="http://schemas.microsoft.com/office/powerpoint/2010/main" val="1129245557"/>
+      </p:ext>
+    </p:extLst>
+  </p:cSld>
+  <p:clrMapOvr>
+    <a:masterClrMapping/>
+  </p:clrMapOvr>
+</p:sld>
+</file>
+
 <file path=ppt/theme/theme1.xml><?xml version="1.0" encoding="utf-8"?>
 <a:theme xmlns:a="http://schemas.openxmlformats.org/drawingml/2006/main" name="Office 佈景主題">
   <a:themeElements>
@@ -3821,4 +4549,265 @@
     </a:ext>
   </a:extLst>
 </a:theme>
+</file>
+
+<file path=ppt/theme/theme2.xml><?xml version="1.0" encoding="utf-8"?>
+<a:theme xmlns:a="http://schemas.openxmlformats.org/drawingml/2006/main" name="Office 主题​​">
+  <a:themeElements>
+    <a:clrScheme name="Office">
+      <a:dk1>
+        <a:sysClr val="windowText" lastClr="000000"/>
+      </a:dk1>
+      <a:lt1>
+        <a:sysClr val="window" lastClr="FFFFFF"/>
+      </a:lt1>
+      <a:dk2>
+        <a:srgbClr val="44546A"/>
+      </a:dk2>
+      <a:lt2>
+        <a:srgbClr val="E7E6E6"/>
+      </a:lt2>
+      <a:accent1>
+        <a:srgbClr val="5B9BD5"/>
+      </a:accent1>
+      <a:accent2>
+        <a:srgbClr val="ED7D31"/>
+      </a:accent2>
+      <a:accent3>
+        <a:srgbClr val="A5A5A5"/>
+      </a:accent3>
+      <a:accent4>
+        <a:srgbClr val="FFC000"/>
+      </a:accent4>
+      <a:accent5>
+        <a:srgbClr val="4472C4"/>
+      </a:accent5>
+      <a:accent6>
+        <a:srgbClr val="70AD47"/>
+      </a:accent6>
+      <a:hlink>
+        <a:srgbClr val="0563C1"/>
+      </a:hlink>
+      <a:folHlink>
+        <a:srgbClr val="954F72"/>
+      </a:folHlink>
+    </a:clrScheme>
+    <a:fontScheme name="Office">
+      <a:majorFont>
+        <a:latin typeface="等线 Light" panose="020F0302020204030204"/>
+        <a:ea typeface=""/>
+        <a:cs typeface=""/>
+        <a:font script="Jpan" typeface="游ゴシック Light"/>
+        <a:font script="Hang" typeface="맑은 고딕"/>
+        <a:font script="Hans" typeface="等线 Light"/>
+        <a:font script="Hant" typeface="新細明體"/>
+        <a:font script="Arab" typeface="Times New Roman"/>
+        <a:font script="Hebr" typeface="Times New Roman"/>
+        <a:font script="Thai" typeface="Angsana New"/>
+        <a:font script="Ethi" typeface="Nyala"/>
+        <a:font script="Beng" typeface="Vrinda"/>
+        <a:font script="Gujr" typeface="Shruti"/>
+        <a:font script="Khmr" typeface="MoolBoran"/>
+        <a:font script="Knda" typeface="Tunga"/>
+        <a:font script="Guru" typeface="Raavi"/>
+        <a:font script="Cans" typeface="Euphemia"/>
+        <a:font script="Cher" typeface="Plantagenet Cherokee"/>
+        <a:font script="Yiii" typeface="Microsoft Yi Baiti"/>
+        <a:font script="Tibt" typeface="Microsoft Himalaya"/>
+        <a:font script="Thaa" typeface="MV Boli"/>
+        <a:font script="Deva" typeface="Mangal"/>
+        <a:font script="Telu" typeface="Gautami"/>
+        <a:font script="Taml" typeface="Latha"/>
+        <a:font script="Syrc" typeface="Estrangelo Edessa"/>
+        <a:font script="Orya" typeface="Kalinga"/>
+        <a:font script="Mlym" typeface="Kartika"/>
+        <a:font script="Laoo" typeface="DokChampa"/>
+        <a:font script="Sinh" typeface="Iskoola Pota"/>
+        <a:font script="Mong" typeface="Mongolian Baiti"/>
+        <a:font script="Viet" typeface="Times New Roman"/>
+        <a:font script="Uigh" typeface="Microsoft Uighur"/>
+        <a:font script="Geor" typeface="Sylfaen"/>
+      </a:majorFont>
+      <a:minorFont>
+        <a:latin typeface="等线" panose="020F0502020204030204"/>
+        <a:ea typeface=""/>
+        <a:cs typeface=""/>
+        <a:font script="Jpan" typeface="游ゴシック"/>
+        <a:font script="Hang" typeface="맑은 고딕"/>
+        <a:font script="Hans" typeface="等线"/>
+        <a:font script="Hant" typeface="新細明體"/>
+        <a:font script="Arab" typeface="Arial"/>
+        <a:font script="Hebr" typeface="Arial"/>
+        <a:font script="Thai" typeface="Cordia New"/>
+        <a:font script="Ethi" typeface="Nyala"/>
+        <a:font script="Beng" typeface="Vrinda"/>
+        <a:font script="Gujr" typeface="Shruti"/>
+        <a:font script="Khmr" typeface="DaunPenh"/>
+        <a:font script="Knda" typeface="Tunga"/>
+        <a:font script="Guru" typeface="Raavi"/>
+        <a:font script="Cans" typeface="Euphemia"/>
+        <a:font script="Cher" typeface="Plantagenet Cherokee"/>
+        <a:font script="Yiii" typeface="Microsoft Yi Baiti"/>
+        <a:font script="Tibt" typeface="Microsoft Himalaya"/>
+        <a:font script="Thaa" typeface="MV Boli"/>
+        <a:font script="Deva" typeface="Mangal"/>
+        <a:font script="Telu" typeface="Gautami"/>
+        <a:font script="Taml" typeface="Latha"/>
+        <a:font script="Syrc" typeface="Estrangelo Edessa"/>
+        <a:font script="Orya" typeface="Kalinga"/>
+        <a:font script="Mlym" typeface="Kartika"/>
+        <a:font script="Laoo" typeface="DokChampa"/>
+        <a:font script="Sinh" typeface="Iskoola Pota"/>
+        <a:font script="Mong" typeface="Mongolian Baiti"/>
+        <a:font script="Viet" typeface="Arial"/>
+        <a:font script="Uigh" typeface="Microsoft Uighur"/>
+        <a:font script="Geor" typeface="Sylfaen"/>
+      </a:minorFont>
+    </a:fontScheme>
+    <a:fmtScheme name="Office">
+      <a:fillStyleLst>
+        <a:solidFill>
+          <a:schemeClr val="phClr"/>
+        </a:solidFill>
+        <a:gradFill rotWithShape="1">
+          <a:gsLst>
+            <a:gs pos="0">
+              <a:schemeClr val="phClr">
+                <a:lumMod val="110000"/>
+                <a:satMod val="105000"/>
+                <a:tint val="67000"/>
+              </a:schemeClr>
+            </a:gs>
+            <a:gs pos="50000">
+              <a:schemeClr val="phClr">
+                <a:lumMod val="105000"/>
+                <a:satMod val="103000"/>
+                <a:tint val="73000"/>
+              </a:schemeClr>
+            </a:gs>
+            <a:gs pos="100000">
+              <a:schemeClr val="phClr">
+                <a:lumMod val="105000"/>
+                <a:satMod val="109000"/>
+                <a:tint val="81000"/>
+              </a:schemeClr>
+            </a:gs>
+          </a:gsLst>
+          <a:lin ang="5400000" scaled="0"/>
+        </a:gradFill>
+        <a:gradFill rotWithShape="1">
+          <a:gsLst>
+            <a:gs pos="0">
+              <a:schemeClr val="phClr">
+                <a:satMod val="103000"/>
+                <a:lumMod val="102000"/>
+                <a:tint val="94000"/>
+              </a:schemeClr>
+            </a:gs>
+            <a:gs pos="50000">
+              <a:schemeClr val="phClr">
+                <a:satMod val="110000"/>
+                <a:lumMod val="100000"/>
+                <a:shade val="100000"/>
+              </a:schemeClr>
+            </a:gs>
+            <a:gs pos="100000">
+              <a:schemeClr val="phClr">
+                <a:lumMod val="99000"/>
+                <a:satMod val="120000"/>
+                <a:shade val="78000"/>
+              </a:schemeClr>
+            </a:gs>
+          </a:gsLst>
+          <a:lin ang="5400000" scaled="0"/>
+        </a:gradFill>
+      </a:fillStyleLst>
+      <a:lnStyleLst>
+        <a:ln w="6350" cap="flat" cmpd="sng" algn="ctr">
+          <a:solidFill>
+            <a:schemeClr val="phClr"/>
+          </a:solidFill>
+          <a:prstDash val="solid"/>
+          <a:miter lim="800000"/>
+        </a:ln>
+        <a:ln w="12700" cap="flat" cmpd="sng" algn="ctr">
+          <a:solidFill>
+            <a:schemeClr val="phClr"/>
+          </a:solidFill>
+          <a:prstDash val="solid"/>
+          <a:miter lim="800000"/>
+        </a:ln>
+        <a:ln w="19050" cap="flat" cmpd="sng" algn="ctr">
+          <a:solidFill>
+            <a:schemeClr val="phClr"/>
+          </a:solidFill>
+          <a:prstDash val="solid"/>
+          <a:miter lim="800000"/>
+        </a:ln>
+      </a:lnStyleLst>
+      <a:effectStyleLst>
+        <a:effectStyle>
+          <a:effectLst/>
+        </a:effectStyle>
+        <a:effectStyle>
+          <a:effectLst/>
+        </a:effectStyle>
+        <a:effectStyle>
+          <a:effectLst>
+            <a:outerShdw blurRad="57150" dist="19050" dir="5400000" algn="ctr" rotWithShape="0">
+              <a:srgbClr val="000000">
+                <a:alpha val="63000"/>
+              </a:srgbClr>
+            </a:outerShdw>
+          </a:effectLst>
+        </a:effectStyle>
+      </a:effectStyleLst>
+      <a:bgFillStyleLst>
+        <a:solidFill>
+          <a:schemeClr val="phClr"/>
+        </a:solidFill>
+        <a:solidFill>
+          <a:schemeClr val="phClr">
+            <a:tint val="95000"/>
+            <a:satMod val="170000"/>
+          </a:schemeClr>
+        </a:solidFill>
+        <a:gradFill rotWithShape="1">
+          <a:gsLst>
+            <a:gs pos="0">
+              <a:schemeClr val="phClr">
+                <a:tint val="93000"/>
+                <a:satMod val="150000"/>
+                <a:shade val="98000"/>
+                <a:lumMod val="102000"/>
+              </a:schemeClr>
+            </a:gs>
+            <a:gs pos="50000">
+              <a:schemeClr val="phClr">
+                <a:tint val="98000"/>
+                <a:satMod val="130000"/>
+                <a:shade val="90000"/>
+                <a:lumMod val="103000"/>
+              </a:schemeClr>
+            </a:gs>
+            <a:gs pos="100000">
+              <a:schemeClr val="phClr">
+                <a:shade val="63000"/>
+                <a:satMod val="120000"/>
+              </a:schemeClr>
+            </a:gs>
+          </a:gsLst>
+          <a:lin ang="5400000" scaled="0"/>
+        </a:gradFill>
+      </a:bgFillStyleLst>
+    </a:fmtScheme>
+  </a:themeElements>
+  <a:objectDefaults/>
+  <a:extraClrSchemeLst/>
+  <a:extLst>
+    <a:ext uri="{05A4C25C-085E-4340-85A3-A5531E510DB2}">
+      <thm15:themeFamily xmlns:thm15="http://schemas.microsoft.com/office/thememl/2012/main" name="Office Theme" id="{62F939B6-93AF-4DB8-9C6B-D6C7DFDC589F}" vid="{4A3C46E8-61CC-4603-A589-7422A47A8E4A}"/>
+    </a:ext>
+  </a:extLst>
+</a:theme>
 </file>
</xml_diff>

<commit_message>
Add the Mysql study into pptx
</commit_message>
<xml_diff>
--- a/DatabaseStudy/MySQL.pptx
+++ b/DatabaseStudy/MySQL.pptx
@@ -5,13 +5,18 @@
     <p:sldMasterId id="2147483648" r:id="rId1"/>
   </p:sldMasterIdLst>
   <p:notesMasterIdLst>
-    <p:notesMasterId r:id="rId6"/>
+    <p:notesMasterId r:id="rId11"/>
   </p:notesMasterIdLst>
   <p:sldIdLst>
     <p:sldId id="256" r:id="rId2"/>
     <p:sldId id="257" r:id="rId3"/>
     <p:sldId id="258" r:id="rId4"/>
-    <p:sldId id="259" r:id="rId5"/>
+    <p:sldId id="263" r:id="rId5"/>
+    <p:sldId id="259" r:id="rId6"/>
+    <p:sldId id="260" r:id="rId7"/>
+    <p:sldId id="261" r:id="rId8"/>
+    <p:sldId id="262" r:id="rId9"/>
+    <p:sldId id="264" r:id="rId10"/>
   </p:sldIdLst>
   <p:sldSz cx="12192000" cy="6858000"/>
   <p:notesSz cx="6858000" cy="9144000"/>
@@ -200,7 +205,7 @@
           <a:p>
             <a:fld id="{B42E79CA-CEA4-4216-B58F-668E25AE62E4}" type="datetimeFigureOut">
               <a:rPr lang="zh-CN" altLang="en-US" smtClean="0"/>
-              <a:t>2023/2/16</a:t>
+              <a:t>2023/2/18</a:t>
             </a:fld>
             <a:endParaRPr lang="zh-CN" altLang="en-US"/>
           </a:p>
@@ -264,38 +269,37 @@
           <a:p>
             <a:pPr lvl="0"/>
             <a:r>
-              <a:rPr lang="zh-CN" altLang="en-US" smtClean="0"/>
+              <a:rPr lang="zh-CN" altLang="en-US"/>
               <a:t>编辑母版文本样式</a:t>
             </a:r>
           </a:p>
           <a:p>
             <a:pPr lvl="1"/>
             <a:r>
-              <a:rPr lang="zh-CN" altLang="en-US" smtClean="0"/>
+              <a:rPr lang="zh-CN" altLang="en-US"/>
               <a:t>第二级</a:t>
             </a:r>
           </a:p>
           <a:p>
             <a:pPr lvl="2"/>
             <a:r>
-              <a:rPr lang="zh-CN" altLang="en-US" smtClean="0"/>
+              <a:rPr lang="zh-CN" altLang="en-US"/>
               <a:t>第三级</a:t>
             </a:r>
           </a:p>
           <a:p>
             <a:pPr lvl="3"/>
             <a:r>
-              <a:rPr lang="zh-CN" altLang="en-US" smtClean="0"/>
+              <a:rPr lang="zh-CN" altLang="en-US"/>
               <a:t>第四级</a:t>
             </a:r>
           </a:p>
           <a:p>
             <a:pPr lvl="4"/>
             <a:r>
-              <a:rPr lang="zh-CN" altLang="en-US" smtClean="0"/>
+              <a:rPr lang="zh-CN" altLang="en-US"/>
               <a:t>第五级</a:t>
             </a:r>
-            <a:endParaRPr lang="zh-CN" altLang="en-US"/>
           </a:p>
         </p:txBody>
       </p:sp>
@@ -533,7 +537,7 @@
           <a:p>
             <a:fld id="{5BF7EF1A-20FF-43CE-BBB0-B76969712B13}" type="slidenum">
               <a:rPr lang="zh-CN" altLang="en-US" smtClean="0"/>
-              <a:t>4</a:t>
+              <a:t>5</a:t>
             </a:fld>
             <a:endParaRPr lang="zh-CN" altLang="en-US"/>
           </a:p>
@@ -699,7 +703,7 @@
           <a:p>
             <a:fld id="{11173057-E3FB-4AE4-9370-CCC1CF2B6FF4}" type="datetimeFigureOut">
               <a:rPr lang="zh-TW" altLang="en-US" smtClean="0"/>
-              <a:t>2023/2/16</a:t>
+              <a:t>2023/2/18</a:t>
             </a:fld>
             <a:endParaRPr lang="zh-TW" altLang="en-US"/>
           </a:p>
@@ -897,7 +901,7 @@
           <a:p>
             <a:fld id="{11173057-E3FB-4AE4-9370-CCC1CF2B6FF4}" type="datetimeFigureOut">
               <a:rPr lang="zh-TW" altLang="en-US" smtClean="0"/>
-              <a:t>2023/2/16</a:t>
+              <a:t>2023/2/18</a:t>
             </a:fld>
             <a:endParaRPr lang="zh-TW" altLang="en-US"/>
           </a:p>
@@ -1105,7 +1109,7 @@
           <a:p>
             <a:fld id="{11173057-E3FB-4AE4-9370-CCC1CF2B6FF4}" type="datetimeFigureOut">
               <a:rPr lang="zh-TW" altLang="en-US" smtClean="0"/>
-              <a:t>2023/2/16</a:t>
+              <a:t>2023/2/18</a:t>
             </a:fld>
             <a:endParaRPr lang="zh-TW" altLang="en-US"/>
           </a:p>
@@ -1303,7 +1307,7 @@
           <a:p>
             <a:fld id="{11173057-E3FB-4AE4-9370-CCC1CF2B6FF4}" type="datetimeFigureOut">
               <a:rPr lang="zh-TW" altLang="en-US" smtClean="0"/>
-              <a:t>2023/2/16</a:t>
+              <a:t>2023/2/18</a:t>
             </a:fld>
             <a:endParaRPr lang="zh-TW" altLang="en-US"/>
           </a:p>
@@ -1578,7 +1582,7 @@
           <a:p>
             <a:fld id="{11173057-E3FB-4AE4-9370-CCC1CF2B6FF4}" type="datetimeFigureOut">
               <a:rPr lang="zh-TW" altLang="en-US" smtClean="0"/>
-              <a:t>2023/2/16</a:t>
+              <a:t>2023/2/18</a:t>
             </a:fld>
             <a:endParaRPr lang="zh-TW" altLang="en-US"/>
           </a:p>
@@ -1843,7 +1847,7 @@
           <a:p>
             <a:fld id="{11173057-E3FB-4AE4-9370-CCC1CF2B6FF4}" type="datetimeFigureOut">
               <a:rPr lang="zh-TW" altLang="en-US" smtClean="0"/>
-              <a:t>2023/2/16</a:t>
+              <a:t>2023/2/18</a:t>
             </a:fld>
             <a:endParaRPr lang="zh-TW" altLang="en-US"/>
           </a:p>
@@ -2255,7 +2259,7 @@
           <a:p>
             <a:fld id="{11173057-E3FB-4AE4-9370-CCC1CF2B6FF4}" type="datetimeFigureOut">
               <a:rPr lang="zh-TW" altLang="en-US" smtClean="0"/>
-              <a:t>2023/2/16</a:t>
+              <a:t>2023/2/18</a:t>
             </a:fld>
             <a:endParaRPr lang="zh-TW" altLang="en-US"/>
           </a:p>
@@ -2396,7 +2400,7 @@
           <a:p>
             <a:fld id="{11173057-E3FB-4AE4-9370-CCC1CF2B6FF4}" type="datetimeFigureOut">
               <a:rPr lang="zh-TW" altLang="en-US" smtClean="0"/>
-              <a:t>2023/2/16</a:t>
+              <a:t>2023/2/18</a:t>
             </a:fld>
             <a:endParaRPr lang="zh-TW" altLang="en-US"/>
           </a:p>
@@ -2509,7 +2513,7 @@
           <a:p>
             <a:fld id="{11173057-E3FB-4AE4-9370-CCC1CF2B6FF4}" type="datetimeFigureOut">
               <a:rPr lang="zh-TW" altLang="en-US" smtClean="0"/>
-              <a:t>2023/2/16</a:t>
+              <a:t>2023/2/18</a:t>
             </a:fld>
             <a:endParaRPr lang="zh-TW" altLang="en-US"/>
           </a:p>
@@ -2820,7 +2824,7 @@
           <a:p>
             <a:fld id="{11173057-E3FB-4AE4-9370-CCC1CF2B6FF4}" type="datetimeFigureOut">
               <a:rPr lang="zh-TW" altLang="en-US" smtClean="0"/>
-              <a:t>2023/2/16</a:t>
+              <a:t>2023/2/18</a:t>
             </a:fld>
             <a:endParaRPr lang="zh-TW" altLang="en-US"/>
           </a:p>
@@ -3108,7 +3112,7 @@
           <a:p>
             <a:fld id="{11173057-E3FB-4AE4-9370-CCC1CF2B6FF4}" type="datetimeFigureOut">
               <a:rPr lang="zh-TW" altLang="en-US" smtClean="0"/>
-              <a:t>2023/2/16</a:t>
+              <a:t>2023/2/18</a:t>
             </a:fld>
             <a:endParaRPr lang="zh-TW" altLang="en-US"/>
           </a:p>
@@ -3349,7 +3353,7 @@
           <a:p>
             <a:fld id="{11173057-E3FB-4AE4-9370-CCC1CF2B6FF4}" type="datetimeFigureOut">
               <a:rPr lang="zh-TW" altLang="en-US" smtClean="0"/>
-              <a:t>2023/2/16</a:t>
+              <a:t>2023/2/18</a:t>
             </a:fld>
             <a:endParaRPr lang="zh-TW" altLang="en-US"/>
           </a:p>
@@ -4012,10 +4016,9 @@
           <a:lstStyle/>
           <a:p>
             <a:r>
-              <a:rPr lang="zh-CN" altLang="en-US" b="1" u="sng" dirty="0" smtClean="0"/>
+              <a:rPr lang="zh-CN" altLang="en-US" b="1" u="sng" dirty="0"/>
               <a:t>一些特殊符号</a:t>
             </a:r>
-            <a:endParaRPr lang="zh-CN" altLang="en-US" b="1" u="sng" dirty="0"/>
           </a:p>
         </p:txBody>
       </p:sp>
@@ -4042,22 +4045,21 @@
           <a:lstStyle/>
           <a:p>
             <a:r>
-              <a:rPr lang="en-US" altLang="zh-CN" dirty="0" smtClean="0"/>
+              <a:rPr lang="en-US" altLang="zh-CN" dirty="0"/>
               <a:t>\c    </a:t>
             </a:r>
             <a:r>
-              <a:rPr lang="zh-CN" altLang="en-US" dirty="0" smtClean="0"/>
+              <a:rPr lang="zh-CN" altLang="en-US" dirty="0"/>
               <a:t>可以停止输入</a:t>
             </a:r>
             <a:r>
-              <a:rPr lang="en-US" altLang="zh-CN" dirty="0" err="1" smtClean="0"/>
+              <a:rPr lang="en-US" altLang="zh-CN" dirty="0" err="1"/>
               <a:t>sql</a:t>
             </a:r>
             <a:r>
-              <a:rPr lang="zh-CN" altLang="en-US" dirty="0" smtClean="0"/>
+              <a:rPr lang="zh-CN" altLang="en-US" dirty="0"/>
               <a:t>语句</a:t>
             </a:r>
-            <a:endParaRPr lang="zh-CN" altLang="en-US" dirty="0"/>
           </a:p>
         </p:txBody>
       </p:sp>
@@ -4093,14 +4095,20 @@
       </p:grpSpPr>
       <p:sp>
         <p:nvSpPr>
-          <p:cNvPr id="4" name="文本框 3"/>
+          <p:cNvPr id="4" name="文字方塊 3">
+            <a:extLst>
+              <a:ext uri="{FF2B5EF4-FFF2-40B4-BE49-F238E27FC236}">
+                <a16:creationId xmlns:a16="http://schemas.microsoft.com/office/drawing/2014/main" id="{41D3A952-946E-4898-A375-5F0ED35A2103}"/>
+              </a:ext>
+            </a:extLst>
+          </p:cNvPr>
           <p:cNvSpPr txBox="1"/>
           <p:nvPr/>
         </p:nvSpPr>
         <p:spPr>
           <a:xfrm>
-            <a:off x="318655" y="263236"/>
-            <a:ext cx="7653890" cy="2031325"/>
+            <a:off x="329938" y="311085"/>
+            <a:ext cx="10605155" cy="2862322"/>
           </a:xfrm>
           <a:prstGeom prst="rect">
             <a:avLst/>
@@ -4108,105 +4116,385 @@
           <a:noFill/>
         </p:spPr>
         <p:txBody>
+          <a:bodyPr wrap="square" rtlCol="0">
+            <a:spAutoFit/>
+          </a:bodyPr>
+          <a:lstStyle/>
+          <a:p>
+            <a:r>
+              <a:rPr lang="en-US" altLang="zh-TW" dirty="0" err="1"/>
+              <a:t>Sql</a:t>
+            </a:r>
+            <a:r>
+              <a:rPr lang="zh-CN" altLang="en-US" dirty="0"/>
+              <a:t>數據導入到數據庫</a:t>
+            </a:r>
+            <a:endParaRPr lang="en-US" altLang="zh-CN" dirty="0"/>
+          </a:p>
+          <a:p>
+            <a:endParaRPr lang="en-US" altLang="zh-TW" dirty="0"/>
+          </a:p>
+          <a:p>
+            <a:r>
+              <a:rPr lang="en-US" altLang="zh-TW" dirty="0"/>
+              <a:t>	</a:t>
+            </a:r>
+            <a:r>
+              <a:rPr lang="en-US" altLang="zh-CN" dirty="0"/>
+              <a:t>1.   </a:t>
+            </a:r>
+            <a:r>
+              <a:rPr lang="zh-CN" altLang="en-US" dirty="0"/>
+              <a:t>沒有進入</a:t>
+            </a:r>
+            <a:r>
+              <a:rPr lang="en-US" altLang="zh-CN" dirty="0" err="1"/>
+              <a:t>mysql</a:t>
+            </a:r>
+            <a:r>
+              <a:rPr lang="zh-CN" altLang="en-US" dirty="0"/>
+              <a:t>，指令   </a:t>
+            </a:r>
+            <a:r>
+              <a:rPr lang="en-US" altLang="zh-CN" dirty="0"/>
+              <a:t>---            </a:t>
+            </a:r>
+            <a:r>
+              <a:rPr lang="en-US" altLang="zh-CN" dirty="0" err="1"/>
+              <a:t>mysql</a:t>
+            </a:r>
+            <a:r>
+              <a:rPr lang="en-US" altLang="zh-CN" dirty="0"/>
+              <a:t> --</a:t>
+            </a:r>
+            <a:r>
+              <a:rPr lang="en-US" altLang="zh-CN" dirty="0" err="1"/>
+              <a:t>uroot</a:t>
+            </a:r>
+            <a:r>
+              <a:rPr lang="en-US" altLang="zh-CN" dirty="0"/>
+              <a:t>  --</a:t>
+            </a:r>
+            <a:r>
+              <a:rPr lang="en-US" altLang="zh-CN" dirty="0" err="1"/>
+              <a:t>proot</a:t>
+            </a:r>
+            <a:r>
+              <a:rPr lang="en-US" altLang="zh-CN" dirty="0"/>
+              <a:t>  </a:t>
+            </a:r>
+            <a:r>
+              <a:rPr lang="zh-CN" altLang="en-US" dirty="0"/>
+              <a:t>數據庫</a:t>
+            </a:r>
+            <a:r>
+              <a:rPr lang="en-US" altLang="zh-CN" dirty="0"/>
+              <a:t>&lt;  </a:t>
+            </a:r>
+            <a:r>
+              <a:rPr lang="en-US" altLang="zh-CN" dirty="0" err="1"/>
+              <a:t>sql</a:t>
+            </a:r>
+            <a:r>
+              <a:rPr lang="zh-CN" altLang="en-US" dirty="0"/>
+              <a:t>文件</a:t>
+            </a:r>
+            <a:endParaRPr lang="en-US" altLang="zh-CN" dirty="0"/>
+          </a:p>
+          <a:p>
+            <a:r>
+              <a:rPr lang="en-US" altLang="zh-CN" dirty="0"/>
+              <a:t>	       </a:t>
+            </a:r>
+            <a:r>
+              <a:rPr lang="zh-CN" altLang="en-US" dirty="0"/>
+              <a:t>進入了</a:t>
+            </a:r>
+            <a:r>
+              <a:rPr lang="en-US" altLang="zh-CN" dirty="0" err="1"/>
+              <a:t>mysql</a:t>
+            </a:r>
+            <a:r>
+              <a:rPr lang="zh-CN" altLang="en-US" dirty="0"/>
+              <a:t>，指令  </a:t>
+            </a:r>
+            <a:r>
+              <a:rPr lang="en-US" altLang="zh-CN" dirty="0"/>
+              <a:t>---    source </a:t>
+            </a:r>
+            <a:r>
+              <a:rPr lang="en-US" altLang="zh-CN" dirty="0" err="1"/>
+              <a:t>sql</a:t>
+            </a:r>
+            <a:r>
+              <a:rPr lang="zh-CN" altLang="en-US" dirty="0"/>
+              <a:t>文件</a:t>
+            </a:r>
+            <a:endParaRPr lang="en-US" altLang="zh-CN" dirty="0"/>
+          </a:p>
+          <a:p>
+            <a:endParaRPr lang="en-US" altLang="zh-CN" dirty="0"/>
+          </a:p>
+          <a:p>
+            <a:r>
+              <a:rPr lang="en-US" altLang="zh-CN" dirty="0"/>
+              <a:t>	2.   </a:t>
+            </a:r>
+            <a:r>
+              <a:rPr lang="zh-CN" altLang="en-US" dirty="0"/>
+              <a:t>導入</a:t>
+            </a:r>
+            <a:r>
+              <a:rPr lang="en-US" altLang="zh-CN" dirty="0"/>
+              <a:t>txt</a:t>
+            </a:r>
+            <a:r>
+              <a:rPr lang="zh-CN" altLang="en-US" dirty="0"/>
+              <a:t>數據</a:t>
+            </a:r>
+            <a:r>
+              <a:rPr lang="en-US" altLang="zh-CN" dirty="0"/>
+              <a:t>(</a:t>
+            </a:r>
+            <a:r>
+              <a:rPr lang="zh-CN" altLang="en-US" dirty="0"/>
+              <a:t>進入</a:t>
+            </a:r>
+            <a:r>
+              <a:rPr lang="en-US" altLang="zh-CN" dirty="0" err="1"/>
+              <a:t>mysql</a:t>
+            </a:r>
+            <a:r>
+              <a:rPr lang="en-US" altLang="zh-CN" dirty="0"/>
+              <a:t>)</a:t>
+            </a:r>
+            <a:r>
+              <a:rPr lang="zh-CN" altLang="en-US" dirty="0"/>
+              <a:t>   </a:t>
+            </a:r>
+            <a:r>
+              <a:rPr lang="en-US" altLang="zh-CN" dirty="0"/>
+              <a:t>---  load data local </a:t>
+            </a:r>
+            <a:r>
+              <a:rPr lang="en-US" altLang="zh-CN" dirty="0" err="1"/>
+              <a:t>infile</a:t>
+            </a:r>
+            <a:r>
+              <a:rPr lang="en-US" altLang="zh-CN" dirty="0"/>
+              <a:t> ‘</a:t>
+            </a:r>
+            <a:r>
+              <a:rPr lang="zh-CN" altLang="en-US" dirty="0"/>
+              <a:t>文件名</a:t>
+            </a:r>
+            <a:r>
+              <a:rPr lang="en-US" altLang="zh-CN" dirty="0"/>
+              <a:t>’ into table  </a:t>
+            </a:r>
+            <a:r>
+              <a:rPr lang="zh-CN" altLang="en-US" dirty="0"/>
+              <a:t>表名 </a:t>
+            </a:r>
+            <a:endParaRPr lang="en-US" altLang="zh-CN" dirty="0"/>
+          </a:p>
+          <a:p>
+            <a:r>
+              <a:rPr lang="en-US" altLang="zh-CN" dirty="0"/>
+              <a:t>	           </a:t>
+            </a:r>
+            <a:r>
+              <a:rPr lang="zh-CN" altLang="en-US" dirty="0"/>
+              <a:t>執行此命令需要打開如下步驟</a:t>
+            </a:r>
+            <a:r>
+              <a:rPr lang="en-US" altLang="zh-CN" dirty="0"/>
+              <a:t>:</a:t>
+            </a:r>
+          </a:p>
+          <a:p>
+            <a:r>
+              <a:rPr lang="en-US" altLang="zh-TW" dirty="0"/>
+              <a:t>		(1)  show global variables like ‘</a:t>
+            </a:r>
+            <a:r>
+              <a:rPr lang="en-US" altLang="zh-TW" dirty="0" err="1"/>
+              <a:t>local_infile</a:t>
+            </a:r>
+            <a:r>
+              <a:rPr lang="en-US" altLang="zh-TW" dirty="0"/>
+              <a:t>’</a:t>
+            </a:r>
+          </a:p>
+          <a:p>
+            <a:r>
+              <a:rPr lang="en-US" altLang="zh-TW" dirty="0"/>
+              <a:t>		(2)  </a:t>
+            </a:r>
+            <a:r>
+              <a:rPr lang="zh-CN" altLang="en-US" dirty="0"/>
+              <a:t>確認‘</a:t>
+            </a:r>
+            <a:r>
+              <a:rPr lang="en-US" altLang="zh-CN" dirty="0" err="1"/>
+              <a:t>local_infile</a:t>
+            </a:r>
+            <a:r>
+              <a:rPr lang="zh-CN" altLang="en-US" dirty="0"/>
+              <a:t>’狀態是</a:t>
+            </a:r>
+            <a:r>
+              <a:rPr lang="en-US" altLang="zh-CN" dirty="0"/>
+              <a:t>ON</a:t>
+            </a:r>
+          </a:p>
+          <a:p>
+            <a:r>
+              <a:rPr lang="en-US" altLang="zh-TW" dirty="0"/>
+              <a:t>		(3)  </a:t>
+            </a:r>
+            <a:r>
+              <a:rPr lang="zh-CN" altLang="en-US" dirty="0"/>
+              <a:t>登錄語句  </a:t>
+            </a:r>
+            <a:r>
+              <a:rPr lang="en-US" altLang="zh-CN" dirty="0" err="1"/>
+              <a:t>mysql</a:t>
+            </a:r>
+            <a:r>
+              <a:rPr lang="en-US" altLang="zh-CN" dirty="0"/>
+              <a:t> –u root -p --local-</a:t>
+            </a:r>
+            <a:r>
+              <a:rPr lang="en-US" altLang="zh-CN" dirty="0" err="1"/>
+              <a:t>infile</a:t>
+            </a:r>
+            <a:r>
+              <a:rPr lang="en-US" altLang="zh-CN" dirty="0"/>
+              <a:t> </a:t>
+            </a:r>
+            <a:r>
+              <a:rPr lang="en-US" altLang="zh-TW" dirty="0"/>
+              <a:t>	</a:t>
+            </a:r>
+            <a:endParaRPr lang="zh-TW" altLang="en-US" dirty="0"/>
+          </a:p>
+        </p:txBody>
+      </p:sp>
+    </p:spTree>
+    <p:extLst>
+      <p:ext uri="{BB962C8B-B14F-4D97-AF65-F5344CB8AC3E}">
+        <p14:creationId xmlns:p14="http://schemas.microsoft.com/office/powerpoint/2010/main" val="848187561"/>
+      </p:ext>
+    </p:extLst>
+  </p:cSld>
+  <p:clrMapOvr>
+    <a:masterClrMapping/>
+  </p:clrMapOvr>
+</p:sld>
+</file>
+
+<file path=ppt/slides/slide5.xml><?xml version="1.0" encoding="utf-8"?>
+<p:sld xmlns:a="http://schemas.openxmlformats.org/drawingml/2006/main" xmlns:r="http://schemas.openxmlformats.org/officeDocument/2006/relationships" xmlns:p="http://schemas.openxmlformats.org/presentationml/2006/main">
+  <p:cSld>
+    <p:spTree>
+      <p:nvGrpSpPr>
+        <p:cNvPr id="1" name=""/>
+        <p:cNvGrpSpPr/>
+        <p:nvPr/>
+      </p:nvGrpSpPr>
+      <p:grpSpPr>
+        <a:xfrm>
+          <a:off x="0" y="0"/>
+          <a:ext cx="0" cy="0"/>
+          <a:chOff x="0" y="0"/>
+          <a:chExt cx="0" cy="0"/>
+        </a:xfrm>
+      </p:grpSpPr>
+      <p:sp>
+        <p:nvSpPr>
+          <p:cNvPr id="4" name="文本框 3"/>
+          <p:cNvSpPr txBox="1"/>
+          <p:nvPr/>
+        </p:nvSpPr>
+        <p:spPr>
+          <a:xfrm>
+            <a:off x="318655" y="263236"/>
+            <a:ext cx="7653890" cy="2862322"/>
+          </a:xfrm>
+          <a:prstGeom prst="rect">
+            <a:avLst/>
+          </a:prstGeom>
+          <a:noFill/>
+        </p:spPr>
+        <p:txBody>
           <a:bodyPr wrap="none" rtlCol="0">
             <a:spAutoFit/>
           </a:bodyPr>
           <a:lstStyle/>
           <a:p>
             <a:r>
-              <a:rPr lang="zh-CN" altLang="en-US" b="1" u="sng" dirty="0" smtClean="0"/>
+              <a:rPr lang="zh-CN" altLang="en-US" b="1" u="sng" dirty="0"/>
               <a:t>数据库操作语句语句</a:t>
             </a:r>
-            <a:endParaRPr lang="en-US" altLang="zh-CN" b="1" u="sng" dirty="0" smtClean="0"/>
+            <a:endParaRPr lang="en-US" altLang="zh-CN" b="1" u="sng" dirty="0"/>
           </a:p>
           <a:p>
             <a:endParaRPr lang="en-US" altLang="zh-CN" dirty="0"/>
           </a:p>
           <a:p>
             <a:r>
-              <a:rPr lang="en-US" altLang="zh-CN" dirty="0" smtClean="0"/>
+              <a:rPr lang="en-US" altLang="zh-CN" dirty="0"/>
               <a:t>	1.   select user();      ---  </a:t>
             </a:r>
             <a:r>
-              <a:rPr lang="zh-CN" altLang="en-US" dirty="0" smtClean="0"/>
+              <a:rPr lang="zh-CN" altLang="en-US" dirty="0"/>
               <a:t>查询当前用户</a:t>
             </a:r>
-            <a:endParaRPr lang="en-US" altLang="zh-CN" dirty="0" smtClean="0"/>
-          </a:p>
-          <a:p>
-            <a:r>
-              <a:rPr lang="en-US" altLang="zh-CN" dirty="0"/>
-              <a:t>	</a:t>
-            </a:r>
-            <a:r>
-              <a:rPr lang="en-US" altLang="zh-CN" dirty="0" smtClean="0"/>
-              <a:t>2.   select database();   --- </a:t>
-            </a:r>
-            <a:r>
-              <a:rPr lang="zh-CN" altLang="en-US" dirty="0" smtClean="0"/>
+            <a:endParaRPr lang="en-US" altLang="zh-CN" dirty="0"/>
+          </a:p>
+          <a:p>
+            <a:r>
+              <a:rPr lang="en-US" altLang="zh-CN" dirty="0"/>
+              <a:t>	2.   select database();   --- </a:t>
+            </a:r>
+            <a:r>
+              <a:rPr lang="zh-CN" altLang="en-US" dirty="0"/>
               <a:t>查询当前数据库</a:t>
             </a:r>
-            <a:endParaRPr lang="en-US" altLang="zh-CN" dirty="0" smtClean="0"/>
-          </a:p>
-          <a:p>
-            <a:r>
-              <a:rPr lang="en-US" altLang="zh-CN" dirty="0"/>
-              <a:t>	</a:t>
-            </a:r>
-            <a:r>
-              <a:rPr lang="en-US" altLang="zh-CN" dirty="0" smtClean="0"/>
-              <a:t>3.   create database + </a:t>
-            </a:r>
-            <a:r>
-              <a:rPr lang="zh-CN" altLang="en-US" dirty="0" smtClean="0"/>
+            <a:endParaRPr lang="en-US" altLang="zh-CN" dirty="0"/>
+          </a:p>
+          <a:p>
+            <a:r>
+              <a:rPr lang="en-US" altLang="zh-CN" dirty="0"/>
+              <a:t>	3.   create database + </a:t>
+            </a:r>
+            <a:r>
+              <a:rPr lang="zh-CN" altLang="en-US" dirty="0"/>
               <a:t>数据库名字 </a:t>
             </a:r>
             <a:r>
-              <a:rPr lang="en-US" altLang="zh-CN" dirty="0" smtClean="0"/>
+              <a:rPr lang="en-US" altLang="zh-CN" dirty="0"/>
               <a:t>--- </a:t>
             </a:r>
             <a:r>
-              <a:rPr lang="zh-CN" altLang="en-US" dirty="0" smtClean="0"/>
-              <a:t>创建</a:t>
-            </a:r>
-            <a:r>
-              <a:rPr lang="zh-CN" altLang="en-US" dirty="0"/>
-              <a:t>一</a:t>
-            </a:r>
-            <a:r>
-              <a:rPr lang="zh-CN" altLang="en-US" dirty="0" smtClean="0"/>
-              <a:t>个数据库</a:t>
-            </a:r>
-            <a:endParaRPr lang="en-US" altLang="zh-CN" dirty="0" smtClean="0"/>
-          </a:p>
-          <a:p>
-            <a:r>
-              <a:rPr lang="en-US" altLang="zh-CN" dirty="0"/>
-              <a:t>	</a:t>
-            </a:r>
-            <a:r>
-              <a:rPr lang="en-US" altLang="zh-CN" dirty="0" smtClean="0"/>
-              <a:t>4</a:t>
-            </a:r>
-            <a:r>
-              <a:rPr lang="en-US" altLang="zh-CN" dirty="0"/>
-              <a:t>. </a:t>
-            </a:r>
-            <a:r>
-              <a:rPr lang="en-US" altLang="zh-CN" dirty="0" smtClean="0"/>
-              <a:t> </a:t>
-            </a:r>
-            <a:r>
-              <a:rPr lang="en-US" altLang="zh-CN" dirty="0" err="1" smtClean="0"/>
+              <a:rPr lang="zh-CN" altLang="en-US" dirty="0"/>
+              <a:t>创建一个数据库</a:t>
+            </a:r>
+            <a:endParaRPr lang="en-US" altLang="zh-CN" dirty="0"/>
+          </a:p>
+          <a:p>
+            <a:r>
+              <a:rPr lang="en-US" altLang="zh-CN" dirty="0"/>
+              <a:t>	4.  </a:t>
+            </a:r>
+            <a:r>
+              <a:rPr lang="en-US" altLang="zh-CN" dirty="0" err="1"/>
               <a:t>mysql</a:t>
             </a:r>
             <a:r>
-              <a:rPr lang="en-US" altLang="zh-CN" dirty="0" smtClean="0"/>
-              <a:t> </a:t>
-            </a:r>
-            <a:r>
-              <a:rPr lang="en-US" altLang="zh-CN" dirty="0"/>
-              <a:t>-</a:t>
+              <a:rPr lang="en-US" altLang="zh-CN" dirty="0"/>
+              <a:t> -</a:t>
             </a:r>
             <a:r>
               <a:rPr lang="en-US" altLang="zh-CN" dirty="0" err="1"/>
@@ -4217,29 +4505,89 @@
               <a:t> -p </a:t>
             </a:r>
             <a:r>
-              <a:rPr lang="en-US" altLang="zh-CN" dirty="0" err="1" smtClean="0"/>
+              <a:rPr lang="en-US" altLang="zh-CN" dirty="0" err="1"/>
               <a:t>testsql</a:t>
             </a:r>
             <a:r>
-              <a:rPr lang="en-US" altLang="zh-CN" dirty="0" smtClean="0"/>
+              <a:rPr lang="en-US" altLang="zh-CN" dirty="0"/>
               <a:t>  --- </a:t>
             </a:r>
             <a:r>
-              <a:rPr lang="zh-CN" altLang="en-US" dirty="0" smtClean="0"/>
+              <a:rPr lang="zh-CN" altLang="en-US" dirty="0"/>
               <a:t>指定数据库登录不需要再使用</a:t>
             </a:r>
             <a:r>
-              <a:rPr lang="en-US" altLang="zh-CN" dirty="0" smtClean="0"/>
+              <a:rPr lang="en-US" altLang="zh-CN" dirty="0"/>
               <a:t>use</a:t>
             </a:r>
             <a:r>
-              <a:rPr lang="zh-CN" altLang="en-US" dirty="0" smtClean="0"/>
+              <a:rPr lang="zh-CN" altLang="en-US" dirty="0"/>
               <a:t>语句</a:t>
             </a:r>
-            <a:endParaRPr lang="en-US" altLang="zh-CN" dirty="0" smtClean="0"/>
-          </a:p>
-          <a:p>
-            <a:endParaRPr lang="en-US" altLang="zh-CN" dirty="0" smtClean="0"/>
+            <a:endParaRPr lang="en-US" altLang="zh-CN" dirty="0"/>
+          </a:p>
+          <a:p>
+            <a:r>
+              <a:rPr lang="en-US" altLang="zh-CN" dirty="0"/>
+              <a:t>	5.  show tables   --- </a:t>
+            </a:r>
+            <a:r>
+              <a:rPr lang="zh-CN" altLang="en-US" dirty="0"/>
+              <a:t>查看現在數據庫當中表名</a:t>
+            </a:r>
+            <a:endParaRPr lang="en-US" altLang="zh-CN" dirty="0"/>
+          </a:p>
+          <a:p>
+            <a:r>
+              <a:rPr lang="en-US" altLang="zh-CN" dirty="0"/>
+              <a:t>	6.  desc </a:t>
+            </a:r>
+            <a:r>
+              <a:rPr lang="zh-CN" altLang="en-US" dirty="0"/>
+              <a:t>數據庫 </a:t>
+            </a:r>
+            <a:r>
+              <a:rPr lang="en-US" altLang="zh-CN" dirty="0"/>
+              <a:t>‘%name’   ---  </a:t>
+            </a:r>
+            <a:r>
+              <a:rPr lang="zh-CN" altLang="en-US" dirty="0"/>
+              <a:t>查看數據庫帶有</a:t>
+            </a:r>
+            <a:r>
+              <a:rPr lang="en-US" altLang="zh-CN" dirty="0"/>
+              <a:t>name</a:t>
+            </a:r>
+            <a:r>
+              <a:rPr lang="zh-CN" altLang="en-US" dirty="0"/>
+              <a:t>字串的列名</a:t>
+            </a:r>
+            <a:r>
+              <a:rPr lang="en-US" altLang="zh-CN" dirty="0"/>
+              <a:t> </a:t>
+            </a:r>
+          </a:p>
+          <a:p>
+            <a:r>
+              <a:rPr lang="en-US" altLang="zh-CN" dirty="0"/>
+              <a:t>	7.  desc </a:t>
+            </a:r>
+            <a:r>
+              <a:rPr lang="zh-CN" altLang="en-US" dirty="0"/>
+              <a:t>數據庫表名 列名  </a:t>
+            </a:r>
+            <a:r>
+              <a:rPr lang="en-US" altLang="zh-CN" dirty="0"/>
+              <a:t>--- </a:t>
+            </a:r>
+            <a:r>
+              <a:rPr lang="zh-CN" altLang="en-US" dirty="0"/>
+              <a:t>可以看到詳細的列信息</a:t>
+            </a:r>
+            <a:endParaRPr lang="en-US" altLang="zh-CN" dirty="0"/>
+          </a:p>
+          <a:p>
+            <a:endParaRPr lang="en-US" altLang="zh-CN" dirty="0"/>
           </a:p>
         </p:txBody>
       </p:sp>
@@ -4247,6 +4595,684 @@
     <p:extLst>
       <p:ext uri="{BB962C8B-B14F-4D97-AF65-F5344CB8AC3E}">
         <p14:creationId xmlns:p14="http://schemas.microsoft.com/office/powerpoint/2010/main" val="1129245557"/>
+      </p:ext>
+    </p:extLst>
+  </p:cSld>
+  <p:clrMapOvr>
+    <a:masterClrMapping/>
+  </p:clrMapOvr>
+</p:sld>
+</file>
+
+<file path=ppt/slides/slide6.xml><?xml version="1.0" encoding="utf-8"?>
+<p:sld xmlns:a="http://schemas.openxmlformats.org/drawingml/2006/main" xmlns:r="http://schemas.openxmlformats.org/officeDocument/2006/relationships" xmlns:p="http://schemas.openxmlformats.org/presentationml/2006/main">
+  <p:cSld>
+    <p:spTree>
+      <p:nvGrpSpPr>
+        <p:cNvPr id="1" name=""/>
+        <p:cNvGrpSpPr/>
+        <p:nvPr/>
+      </p:nvGrpSpPr>
+      <p:grpSpPr>
+        <a:xfrm>
+          <a:off x="0" y="0"/>
+          <a:ext cx="0" cy="0"/>
+          <a:chOff x="0" y="0"/>
+          <a:chExt cx="0" cy="0"/>
+        </a:xfrm>
+      </p:grpSpPr>
+      <p:sp>
+        <p:nvSpPr>
+          <p:cNvPr id="4" name="文字方塊 3">
+            <a:extLst>
+              <a:ext uri="{FF2B5EF4-FFF2-40B4-BE49-F238E27FC236}">
+                <a16:creationId xmlns:a16="http://schemas.microsoft.com/office/drawing/2014/main" id="{7586709F-8C27-4FC4-B988-EFB8EDB5168F}"/>
+              </a:ext>
+            </a:extLst>
+          </p:cNvPr>
+          <p:cNvSpPr txBox="1"/>
+          <p:nvPr/>
+        </p:nvSpPr>
+        <p:spPr>
+          <a:xfrm>
+            <a:off x="282804" y="348792"/>
+            <a:ext cx="6463244" cy="2031325"/>
+          </a:xfrm>
+          <a:prstGeom prst="rect">
+            <a:avLst/>
+          </a:prstGeom>
+          <a:noFill/>
+        </p:spPr>
+        <p:txBody>
+          <a:bodyPr wrap="none" rtlCol="0">
+            <a:spAutoFit/>
+          </a:bodyPr>
+          <a:lstStyle/>
+          <a:p>
+            <a:r>
+              <a:rPr lang="zh-CN" altLang="en-US" b="1" u="sng" dirty="0"/>
+              <a:t>數據庫數據類型</a:t>
+            </a:r>
+            <a:endParaRPr lang="en-US" altLang="zh-CN" b="1" u="sng" dirty="0"/>
+          </a:p>
+          <a:p>
+            <a:endParaRPr lang="en-US" altLang="zh-TW" b="1" u="sng" dirty="0"/>
+          </a:p>
+          <a:p>
+            <a:r>
+              <a:rPr lang="en-US" altLang="zh-TW" dirty="0"/>
+              <a:t>	</a:t>
+            </a:r>
+            <a:r>
+              <a:rPr lang="en-US" altLang="zh-CN" dirty="0"/>
+              <a:t>1.  varchar(n)   ---  </a:t>
+            </a:r>
+            <a:r>
+              <a:rPr lang="zh-CN" altLang="en-US" dirty="0"/>
+              <a:t>代表可變字符串類型類型， 最多是</a:t>
+            </a:r>
+            <a:r>
+              <a:rPr lang="en-US" altLang="zh-CN" dirty="0"/>
+              <a:t>n</a:t>
+            </a:r>
+          </a:p>
+          <a:p>
+            <a:r>
+              <a:rPr lang="en-US" altLang="zh-TW" dirty="0"/>
+              <a:t>	</a:t>
+            </a:r>
+            <a:r>
+              <a:rPr lang="en-US" altLang="zh-CN" dirty="0"/>
+              <a:t>2.  date             ---  </a:t>
+            </a:r>
+            <a:r>
+              <a:rPr lang="zh-CN" altLang="en-US" dirty="0"/>
+              <a:t>按照</a:t>
+            </a:r>
+            <a:r>
+              <a:rPr lang="en-US" altLang="zh-CN" dirty="0"/>
+              <a:t>CCYY-MM-DD</a:t>
+            </a:r>
+            <a:r>
+              <a:rPr lang="zh-CN" altLang="en-US" dirty="0"/>
+              <a:t>格式</a:t>
+            </a:r>
+            <a:endParaRPr lang="en-US" altLang="zh-CN" dirty="0"/>
+          </a:p>
+          <a:p>
+            <a:r>
+              <a:rPr lang="en-US" altLang="zh-TW" dirty="0"/>
+              <a:t>	</a:t>
+            </a:r>
+            <a:r>
+              <a:rPr lang="en-US" altLang="zh-CN" dirty="0"/>
+              <a:t>3.  int                ---   </a:t>
+            </a:r>
+            <a:r>
+              <a:rPr lang="zh-CN" altLang="en-US" dirty="0"/>
+              <a:t>數據列保存整數值</a:t>
+            </a:r>
+            <a:endParaRPr lang="en-US" altLang="zh-CN" dirty="0"/>
+          </a:p>
+          <a:p>
+            <a:r>
+              <a:rPr lang="en-US" altLang="zh-TW" dirty="0"/>
+              <a:t>                 </a:t>
+            </a:r>
+            <a:r>
+              <a:rPr lang="en-US" altLang="zh-CN" dirty="0"/>
+              <a:t>4.  unsigned    ---   </a:t>
+            </a:r>
+            <a:r>
+              <a:rPr lang="zh-CN" altLang="en-US" dirty="0"/>
+              <a:t>不允許出現負數</a:t>
+            </a:r>
+            <a:endParaRPr lang="en-US" altLang="zh-CN" dirty="0"/>
+          </a:p>
+          <a:p>
+            <a:r>
+              <a:rPr lang="en-US" altLang="zh-TW" dirty="0"/>
+              <a:t>	</a:t>
+            </a:r>
+            <a:r>
+              <a:rPr lang="en-US" altLang="zh-CN" dirty="0"/>
+              <a:t>5.  </a:t>
+            </a:r>
+            <a:r>
+              <a:rPr lang="en-US" altLang="zh-CN" dirty="0" err="1"/>
+              <a:t>enum</a:t>
+            </a:r>
+            <a:r>
+              <a:rPr lang="en-US" altLang="zh-CN" dirty="0"/>
+              <a:t>(‘</a:t>
+            </a:r>
+            <a:r>
+              <a:rPr lang="en-US" altLang="zh-CN" dirty="0" err="1"/>
+              <a:t>f’,’m</a:t>
+            </a:r>
+            <a:r>
+              <a:rPr lang="en-US" altLang="zh-CN" dirty="0"/>
+              <a:t>’)  --- </a:t>
+            </a:r>
+            <a:r>
+              <a:rPr lang="zh-CN" altLang="en-US" dirty="0"/>
+              <a:t>枚舉類型只能取</a:t>
+            </a:r>
+            <a:r>
+              <a:rPr lang="en-US" altLang="zh-CN" dirty="0"/>
+              <a:t>f</a:t>
+            </a:r>
+            <a:r>
+              <a:rPr lang="zh-CN" altLang="en-US" dirty="0"/>
+              <a:t>，</a:t>
+            </a:r>
+            <a:r>
+              <a:rPr lang="en-US" altLang="zh-CN" dirty="0"/>
+              <a:t>m</a:t>
+            </a:r>
+            <a:endParaRPr lang="zh-TW" altLang="en-US" dirty="0"/>
+          </a:p>
+        </p:txBody>
+      </p:sp>
+    </p:spTree>
+    <p:extLst>
+      <p:ext uri="{BB962C8B-B14F-4D97-AF65-F5344CB8AC3E}">
+        <p14:creationId xmlns:p14="http://schemas.microsoft.com/office/powerpoint/2010/main" val="1500634408"/>
+      </p:ext>
+    </p:extLst>
+  </p:cSld>
+  <p:clrMapOvr>
+    <a:masterClrMapping/>
+  </p:clrMapOvr>
+</p:sld>
+</file>
+
+<file path=ppt/slides/slide7.xml><?xml version="1.0" encoding="utf-8"?>
+<p:sld xmlns:a="http://schemas.openxmlformats.org/drawingml/2006/main" xmlns:r="http://schemas.openxmlformats.org/officeDocument/2006/relationships" xmlns:p="http://schemas.openxmlformats.org/presentationml/2006/main">
+  <p:cSld>
+    <p:spTree>
+      <p:nvGrpSpPr>
+        <p:cNvPr id="1" name=""/>
+        <p:cNvGrpSpPr/>
+        <p:nvPr/>
+      </p:nvGrpSpPr>
+      <p:grpSpPr>
+        <a:xfrm>
+          <a:off x="0" y="0"/>
+          <a:ext cx="0" cy="0"/>
+          <a:chOff x="0" y="0"/>
+          <a:chExt cx="0" cy="0"/>
+        </a:xfrm>
+      </p:grpSpPr>
+      <p:sp>
+        <p:nvSpPr>
+          <p:cNvPr id="4" name="文字方塊 3">
+            <a:extLst>
+              <a:ext uri="{FF2B5EF4-FFF2-40B4-BE49-F238E27FC236}">
+                <a16:creationId xmlns:a16="http://schemas.microsoft.com/office/drawing/2014/main" id="{A45F3034-DAA0-4D65-94C4-405CF84BAE4D}"/>
+              </a:ext>
+            </a:extLst>
+          </p:cNvPr>
+          <p:cNvSpPr txBox="1"/>
+          <p:nvPr/>
+        </p:nvSpPr>
+        <p:spPr>
+          <a:xfrm>
+            <a:off x="329939" y="320511"/>
+            <a:ext cx="8550111" cy="1200329"/>
+          </a:xfrm>
+          <a:prstGeom prst="rect">
+            <a:avLst/>
+          </a:prstGeom>
+          <a:noFill/>
+        </p:spPr>
+        <p:txBody>
+          <a:bodyPr wrap="square" rtlCol="0">
+            <a:spAutoFit/>
+          </a:bodyPr>
+          <a:lstStyle/>
+          <a:p>
+            <a:r>
+              <a:rPr lang="zh-CN" altLang="en-US" b="1" u="sng" dirty="0"/>
+              <a:t>子句</a:t>
+            </a:r>
+            <a:endParaRPr lang="en-US" altLang="zh-CN" b="1" u="sng" dirty="0"/>
+          </a:p>
+          <a:p>
+            <a:endParaRPr lang="en-US" altLang="zh-TW" b="1" u="sng" dirty="0"/>
+          </a:p>
+          <a:p>
+            <a:r>
+              <a:rPr lang="en-US" altLang="zh-TW" dirty="0"/>
+              <a:t>	</a:t>
+            </a:r>
+            <a:r>
+              <a:rPr lang="en-US" altLang="zh-CN" dirty="0"/>
+              <a:t>1. primary key   ---  </a:t>
+            </a:r>
+            <a:r>
+              <a:rPr lang="zh-CN" altLang="en-US" dirty="0"/>
+              <a:t>創建索引加快查找速度</a:t>
+            </a:r>
+            <a:r>
+              <a:rPr lang="en-US" altLang="zh-CN" dirty="0"/>
+              <a:t>,  </a:t>
+            </a:r>
+            <a:r>
+              <a:rPr lang="zh-CN" altLang="en-US" dirty="0"/>
+              <a:t>不會出現重複</a:t>
+            </a:r>
+            <a:endParaRPr lang="en-US" altLang="zh-CN" dirty="0"/>
+          </a:p>
+          <a:p>
+            <a:r>
+              <a:rPr lang="en-US" altLang="zh-CN" dirty="0"/>
+              <a:t>	2. foreign key   ---   </a:t>
+            </a:r>
+            <a:r>
+              <a:rPr lang="zh-CN" altLang="en-US" dirty="0"/>
+              <a:t>可以防止出現虛假的</a:t>
+            </a:r>
+            <a:r>
+              <a:rPr lang="en-US" altLang="zh-CN" dirty="0"/>
+              <a:t>id</a:t>
+            </a:r>
+            <a:r>
+              <a:rPr lang="zh-CN" altLang="en-US" dirty="0"/>
+              <a:t>值</a:t>
+            </a:r>
+            <a:endParaRPr lang="zh-TW" altLang="en-US" dirty="0"/>
+          </a:p>
+        </p:txBody>
+      </p:sp>
+    </p:spTree>
+    <p:extLst>
+      <p:ext uri="{BB962C8B-B14F-4D97-AF65-F5344CB8AC3E}">
+        <p14:creationId xmlns:p14="http://schemas.microsoft.com/office/powerpoint/2010/main" val="1928463411"/>
+      </p:ext>
+    </p:extLst>
+  </p:cSld>
+  <p:clrMapOvr>
+    <a:masterClrMapping/>
+  </p:clrMapOvr>
+</p:sld>
+</file>
+
+<file path=ppt/slides/slide8.xml><?xml version="1.0" encoding="utf-8"?>
+<p:sld xmlns:a="http://schemas.openxmlformats.org/drawingml/2006/main" xmlns:r="http://schemas.openxmlformats.org/officeDocument/2006/relationships" xmlns:p="http://schemas.openxmlformats.org/presentationml/2006/main">
+  <p:cSld>
+    <p:spTree>
+      <p:nvGrpSpPr>
+        <p:cNvPr id="1" name=""/>
+        <p:cNvGrpSpPr/>
+        <p:nvPr/>
+      </p:nvGrpSpPr>
+      <p:grpSpPr>
+        <a:xfrm>
+          <a:off x="0" y="0"/>
+          <a:ext cx="0" cy="0"/>
+          <a:chOff x="0" y="0"/>
+          <a:chExt cx="0" cy="0"/>
+        </a:xfrm>
+      </p:grpSpPr>
+      <p:sp>
+        <p:nvSpPr>
+          <p:cNvPr id="4" name="文字方塊 3">
+            <a:extLst>
+              <a:ext uri="{FF2B5EF4-FFF2-40B4-BE49-F238E27FC236}">
+                <a16:creationId xmlns:a16="http://schemas.microsoft.com/office/drawing/2014/main" id="{CFE3C75C-2654-4C52-9638-C81C38FAA487}"/>
+              </a:ext>
+            </a:extLst>
+          </p:cNvPr>
+          <p:cNvSpPr txBox="1"/>
+          <p:nvPr/>
+        </p:nvSpPr>
+        <p:spPr>
+          <a:xfrm>
+            <a:off x="263951" y="216816"/>
+            <a:ext cx="7703327" cy="2308324"/>
+          </a:xfrm>
+          <a:prstGeom prst="rect">
+            <a:avLst/>
+          </a:prstGeom>
+          <a:noFill/>
+        </p:spPr>
+        <p:txBody>
+          <a:bodyPr wrap="none" rtlCol="0">
+            <a:spAutoFit/>
+          </a:bodyPr>
+          <a:lstStyle/>
+          <a:p>
+            <a:r>
+              <a:rPr lang="en-US" altLang="zh-TW" b="1" u="sng" dirty="0" err="1"/>
+              <a:t>Mysql</a:t>
+            </a:r>
+            <a:r>
+              <a:rPr lang="zh-CN" altLang="en-US" b="1" u="sng" dirty="0"/>
+              <a:t>中</a:t>
+            </a:r>
+            <a:r>
+              <a:rPr lang="en-US" altLang="zh-CN" b="1" u="sng" dirty="0"/>
+              <a:t>bin</a:t>
+            </a:r>
+            <a:r>
+              <a:rPr lang="zh-CN" altLang="en-US" b="1" u="sng" dirty="0"/>
+              <a:t>目錄工具</a:t>
+            </a:r>
+            <a:endParaRPr lang="en-US" altLang="zh-CN" b="1" u="sng" dirty="0"/>
+          </a:p>
+          <a:p>
+            <a:endParaRPr lang="en-US" altLang="zh-TW" b="1" u="sng" dirty="0"/>
+          </a:p>
+          <a:p>
+            <a:r>
+              <a:rPr lang="en-US" altLang="zh-TW" dirty="0"/>
+              <a:t>	</a:t>
+            </a:r>
+            <a:r>
+              <a:rPr lang="en-US" altLang="zh-CN" dirty="0"/>
+              <a:t>1.   </a:t>
+            </a:r>
+            <a:r>
+              <a:rPr lang="en-US" altLang="zh-CN" dirty="0" err="1"/>
+              <a:t>mysqlshow</a:t>
+            </a:r>
+            <a:r>
+              <a:rPr lang="en-US" altLang="zh-CN" dirty="0"/>
+              <a:t>          ---     </a:t>
+            </a:r>
+            <a:r>
+              <a:rPr lang="zh-CN" altLang="en-US" dirty="0"/>
+              <a:t>列出所有</a:t>
+            </a:r>
+            <a:r>
+              <a:rPr lang="en-US" altLang="zh-CN" dirty="0"/>
+              <a:t>database</a:t>
+            </a:r>
+            <a:r>
+              <a:rPr lang="zh-CN" altLang="en-US" dirty="0"/>
+              <a:t>名字</a:t>
+            </a:r>
+            <a:endParaRPr lang="en-US" altLang="zh-CN" dirty="0"/>
+          </a:p>
+          <a:p>
+            <a:r>
+              <a:rPr lang="en-US" altLang="zh-TW" dirty="0"/>
+              <a:t>	      </a:t>
+            </a:r>
+            <a:r>
+              <a:rPr lang="en-US" altLang="zh-CN" dirty="0" err="1"/>
+              <a:t>mysqlshow</a:t>
+            </a:r>
+            <a:r>
+              <a:rPr lang="en-US" altLang="zh-CN" dirty="0"/>
+              <a:t>  database</a:t>
+            </a:r>
+            <a:r>
+              <a:rPr lang="zh-CN" altLang="en-US" dirty="0"/>
+              <a:t>名字    </a:t>
+            </a:r>
+            <a:r>
+              <a:rPr lang="en-US" altLang="zh-CN" dirty="0"/>
+              <a:t>---   </a:t>
+            </a:r>
+            <a:r>
+              <a:rPr lang="zh-CN" altLang="en-US" dirty="0"/>
+              <a:t>列出所有數據庫名字下面的表名</a:t>
+            </a:r>
+            <a:endParaRPr lang="en-US" altLang="zh-CN" dirty="0"/>
+          </a:p>
+          <a:p>
+            <a:r>
+              <a:rPr lang="en-US" altLang="zh-TW" dirty="0"/>
+              <a:t>	      </a:t>
+            </a:r>
+            <a:r>
+              <a:rPr lang="en-US" altLang="zh-CN" dirty="0" err="1"/>
+              <a:t>mysqlshow</a:t>
+            </a:r>
+            <a:r>
+              <a:rPr lang="en-US" altLang="zh-CN" dirty="0"/>
+              <a:t>   database</a:t>
+            </a:r>
+            <a:r>
+              <a:rPr lang="zh-CN" altLang="en-US" dirty="0"/>
+              <a:t>名字  表名字   </a:t>
+            </a:r>
+            <a:r>
+              <a:rPr lang="en-US" altLang="zh-CN" dirty="0"/>
+              <a:t>---   </a:t>
+            </a:r>
+            <a:r>
+              <a:rPr lang="zh-CN" altLang="en-US" dirty="0"/>
+              <a:t>列出表的結構</a:t>
+            </a:r>
+            <a:endParaRPr lang="en-US" altLang="zh-CN" dirty="0"/>
+          </a:p>
+          <a:p>
+            <a:endParaRPr lang="en-US" altLang="zh-TW" dirty="0"/>
+          </a:p>
+          <a:p>
+            <a:endParaRPr lang="en-US" altLang="zh-TW" dirty="0"/>
+          </a:p>
+          <a:p>
+            <a:r>
+              <a:rPr lang="en-US" altLang="zh-TW" dirty="0"/>
+              <a:t>	2.  </a:t>
+            </a:r>
+            <a:r>
+              <a:rPr lang="en-US" altLang="zh-TW" dirty="0" err="1"/>
+              <a:t>mysql</a:t>
+            </a:r>
+            <a:r>
+              <a:rPr lang="en-US" altLang="zh-TW" dirty="0"/>
+              <a:t> import --local </a:t>
+            </a:r>
+            <a:r>
+              <a:rPr lang="zh-CN" altLang="en-US" dirty="0"/>
+              <a:t>數據庫名字   </a:t>
+            </a:r>
+            <a:r>
+              <a:rPr lang="en-US" altLang="zh-CN" dirty="0"/>
+              <a:t>txt</a:t>
+            </a:r>
+            <a:r>
+              <a:rPr lang="zh-CN" altLang="en-US" dirty="0"/>
+              <a:t>文件路徑</a:t>
+            </a:r>
+            <a:r>
+              <a:rPr lang="en-US" altLang="zh-TW" dirty="0"/>
+              <a:t> </a:t>
+            </a:r>
+            <a:endParaRPr lang="zh-TW" altLang="en-US" dirty="0"/>
+          </a:p>
+        </p:txBody>
+      </p:sp>
+    </p:spTree>
+    <p:extLst>
+      <p:ext uri="{BB962C8B-B14F-4D97-AF65-F5344CB8AC3E}">
+        <p14:creationId xmlns:p14="http://schemas.microsoft.com/office/powerpoint/2010/main" val="4135642054"/>
+      </p:ext>
+    </p:extLst>
+  </p:cSld>
+  <p:clrMapOvr>
+    <a:masterClrMapping/>
+  </p:clrMapOvr>
+</p:sld>
+</file>
+
+<file path=ppt/slides/slide9.xml><?xml version="1.0" encoding="utf-8"?>
+<p:sld xmlns:a="http://schemas.openxmlformats.org/drawingml/2006/main" xmlns:r="http://schemas.openxmlformats.org/officeDocument/2006/relationships" xmlns:p="http://schemas.openxmlformats.org/presentationml/2006/main">
+  <p:cSld>
+    <p:spTree>
+      <p:nvGrpSpPr>
+        <p:cNvPr id="1" name=""/>
+        <p:cNvGrpSpPr/>
+        <p:nvPr/>
+      </p:nvGrpSpPr>
+      <p:grpSpPr>
+        <a:xfrm>
+          <a:off x="0" y="0"/>
+          <a:ext cx="0" cy="0"/>
+          <a:chOff x="0" y="0"/>
+          <a:chExt cx="0" cy="0"/>
+        </a:xfrm>
+      </p:grpSpPr>
+      <p:sp>
+        <p:nvSpPr>
+          <p:cNvPr id="4" name="文字方塊 3">
+            <a:extLst>
+              <a:ext uri="{FF2B5EF4-FFF2-40B4-BE49-F238E27FC236}">
+                <a16:creationId xmlns:a16="http://schemas.microsoft.com/office/drawing/2014/main" id="{C1B2E087-2266-47DA-817B-1C345E1B017E}"/>
+              </a:ext>
+            </a:extLst>
+          </p:cNvPr>
+          <p:cNvSpPr txBox="1"/>
+          <p:nvPr/>
+        </p:nvSpPr>
+        <p:spPr>
+          <a:xfrm>
+            <a:off x="226243" y="273377"/>
+            <a:ext cx="8049255" cy="3139321"/>
+          </a:xfrm>
+          <a:prstGeom prst="rect">
+            <a:avLst/>
+          </a:prstGeom>
+          <a:noFill/>
+        </p:spPr>
+        <p:txBody>
+          <a:bodyPr wrap="none" rtlCol="0">
+            <a:spAutoFit/>
+          </a:bodyPr>
+          <a:lstStyle/>
+          <a:p>
+            <a:r>
+              <a:rPr lang="en-US" altLang="zh-TW" b="1" u="sng" dirty="0"/>
+              <a:t>Database</a:t>
+            </a:r>
+            <a:r>
+              <a:rPr lang="zh-CN" altLang="en-US" b="1" u="sng" dirty="0"/>
+              <a:t>查詢特例</a:t>
+            </a:r>
+            <a:endParaRPr lang="en-US" altLang="zh-CN" b="1" u="sng" dirty="0"/>
+          </a:p>
+          <a:p>
+            <a:endParaRPr lang="en-US" altLang="zh-TW" dirty="0"/>
+          </a:p>
+          <a:p>
+            <a:r>
+              <a:rPr lang="en-US" altLang="zh-TW" dirty="0"/>
+              <a:t>	</a:t>
+            </a:r>
+            <a:r>
+              <a:rPr lang="en-US" altLang="zh-CN" dirty="0"/>
+              <a:t>1.   </a:t>
+            </a:r>
+            <a:r>
+              <a:rPr lang="zh-CN" altLang="en-US" dirty="0"/>
+              <a:t>按照總統的</a:t>
+            </a:r>
+            <a:r>
+              <a:rPr lang="en-US" altLang="zh-CN" dirty="0"/>
+              <a:t>death</a:t>
+            </a:r>
+            <a:r>
+              <a:rPr lang="zh-CN" altLang="en-US" dirty="0"/>
+              <a:t>降序查詢數據，  </a:t>
+            </a:r>
+            <a:r>
+              <a:rPr lang="en-US" altLang="zh-CN" dirty="0"/>
+              <a:t>null</a:t>
+            </a:r>
+            <a:r>
+              <a:rPr lang="zh-CN" altLang="en-US" dirty="0"/>
+              <a:t>始終保持在開頭</a:t>
+            </a:r>
+            <a:endParaRPr lang="en-US" altLang="zh-CN" dirty="0"/>
+          </a:p>
+          <a:p>
+            <a:r>
+              <a:rPr lang="en-US" altLang="zh-TW" dirty="0"/>
+              <a:t>		</a:t>
+            </a:r>
+            <a:r>
+              <a:rPr lang="en-US" altLang="zh-CN" dirty="0"/>
+              <a:t>select </a:t>
+            </a:r>
+            <a:r>
+              <a:rPr lang="zh-CN" altLang="en-US" dirty="0"/>
+              <a:t>* </a:t>
+            </a:r>
+            <a:r>
+              <a:rPr lang="en-US" altLang="zh-CN" dirty="0"/>
+              <a:t>from president order by if(death is null,0,1), death desc;</a:t>
+            </a:r>
+          </a:p>
+          <a:p>
+            <a:endParaRPr lang="en-US" altLang="zh-CN" dirty="0"/>
+          </a:p>
+          <a:p>
+            <a:r>
+              <a:rPr lang="en-US" altLang="zh-CN" dirty="0"/>
+              <a:t>	2.   </a:t>
+            </a:r>
+            <a:r>
+              <a:rPr lang="zh-CN" altLang="en-US" dirty="0"/>
+              <a:t>查詢總統進行隨機排序抽取出一條數據</a:t>
+            </a:r>
+            <a:endParaRPr lang="en-US" altLang="zh-CN" dirty="0"/>
+          </a:p>
+          <a:p>
+            <a:r>
+              <a:rPr lang="en-US" altLang="zh-CN" dirty="0"/>
+              <a:t>		select </a:t>
+            </a:r>
+            <a:r>
+              <a:rPr lang="zh-CN" altLang="en-US" dirty="0"/>
+              <a:t>* </a:t>
+            </a:r>
+            <a:r>
+              <a:rPr lang="en-US" altLang="zh-CN" dirty="0"/>
+              <a:t>from president order by rand() limit 1;</a:t>
+            </a:r>
+          </a:p>
+          <a:p>
+            <a:endParaRPr lang="en-US" altLang="zh-CN" dirty="0"/>
+          </a:p>
+          <a:p>
+            <a:r>
+              <a:rPr lang="en-US" altLang="zh-CN" dirty="0"/>
+              <a:t>	3.  select </a:t>
+            </a:r>
+            <a:r>
+              <a:rPr lang="zh-CN" altLang="en-US" dirty="0"/>
+              <a:t>* </a:t>
+            </a:r>
+            <a:r>
+              <a:rPr lang="en-US" altLang="zh-CN" dirty="0"/>
+              <a:t>from president order by 2;  </a:t>
+            </a:r>
+            <a:r>
+              <a:rPr lang="zh-CN" altLang="en-US"/>
+              <a:t>按第二列進行排序</a:t>
+            </a:r>
+            <a:endParaRPr lang="en-US" altLang="zh-CN" dirty="0"/>
+          </a:p>
+          <a:p>
+            <a:endParaRPr lang="en-US" altLang="zh-TW" dirty="0"/>
+          </a:p>
+          <a:p>
+            <a:r>
+              <a:rPr lang="en-US" altLang="zh-TW" dirty="0"/>
+              <a:t>	</a:t>
+            </a:r>
+          </a:p>
+        </p:txBody>
+      </p:sp>
+    </p:spTree>
+    <p:extLst>
+      <p:ext uri="{BB962C8B-B14F-4D97-AF65-F5344CB8AC3E}">
+        <p14:creationId xmlns:p14="http://schemas.microsoft.com/office/powerpoint/2010/main" val="1868114064"/>
       </p:ext>
     </p:extLst>
   </p:cSld>

</xml_diff>

<commit_message>
Add Study mysql into pptx
</commit_message>
<xml_diff>
--- a/DatabaseStudy/MySQL.pptx
+++ b/DatabaseStudy/MySQL.pptx
@@ -205,7 +205,7 @@
           <a:p>
             <a:fld id="{B42E79CA-CEA4-4216-B58F-668E25AE62E4}" type="datetimeFigureOut">
               <a:rPr lang="zh-CN" altLang="en-US" smtClean="0"/>
-              <a:t>2023/2/18</a:t>
+              <a:t>2023/3/13</a:t>
             </a:fld>
             <a:endParaRPr lang="zh-CN" altLang="en-US"/>
           </a:p>
@@ -703,7 +703,7 @@
           <a:p>
             <a:fld id="{11173057-E3FB-4AE4-9370-CCC1CF2B6FF4}" type="datetimeFigureOut">
               <a:rPr lang="zh-TW" altLang="en-US" smtClean="0"/>
-              <a:t>2023/2/18</a:t>
+              <a:t>2023/3/13</a:t>
             </a:fld>
             <a:endParaRPr lang="zh-TW" altLang="en-US"/>
           </a:p>
@@ -901,7 +901,7 @@
           <a:p>
             <a:fld id="{11173057-E3FB-4AE4-9370-CCC1CF2B6FF4}" type="datetimeFigureOut">
               <a:rPr lang="zh-TW" altLang="en-US" smtClean="0"/>
-              <a:t>2023/2/18</a:t>
+              <a:t>2023/3/13</a:t>
             </a:fld>
             <a:endParaRPr lang="zh-TW" altLang="en-US"/>
           </a:p>
@@ -1109,7 +1109,7 @@
           <a:p>
             <a:fld id="{11173057-E3FB-4AE4-9370-CCC1CF2B6FF4}" type="datetimeFigureOut">
               <a:rPr lang="zh-TW" altLang="en-US" smtClean="0"/>
-              <a:t>2023/2/18</a:t>
+              <a:t>2023/3/13</a:t>
             </a:fld>
             <a:endParaRPr lang="zh-TW" altLang="en-US"/>
           </a:p>
@@ -1307,7 +1307,7 @@
           <a:p>
             <a:fld id="{11173057-E3FB-4AE4-9370-CCC1CF2B6FF4}" type="datetimeFigureOut">
               <a:rPr lang="zh-TW" altLang="en-US" smtClean="0"/>
-              <a:t>2023/2/18</a:t>
+              <a:t>2023/3/13</a:t>
             </a:fld>
             <a:endParaRPr lang="zh-TW" altLang="en-US"/>
           </a:p>
@@ -1582,7 +1582,7 @@
           <a:p>
             <a:fld id="{11173057-E3FB-4AE4-9370-CCC1CF2B6FF4}" type="datetimeFigureOut">
               <a:rPr lang="zh-TW" altLang="en-US" smtClean="0"/>
-              <a:t>2023/2/18</a:t>
+              <a:t>2023/3/13</a:t>
             </a:fld>
             <a:endParaRPr lang="zh-TW" altLang="en-US"/>
           </a:p>
@@ -1847,7 +1847,7 @@
           <a:p>
             <a:fld id="{11173057-E3FB-4AE4-9370-CCC1CF2B6FF4}" type="datetimeFigureOut">
               <a:rPr lang="zh-TW" altLang="en-US" smtClean="0"/>
-              <a:t>2023/2/18</a:t>
+              <a:t>2023/3/13</a:t>
             </a:fld>
             <a:endParaRPr lang="zh-TW" altLang="en-US"/>
           </a:p>
@@ -2259,7 +2259,7 @@
           <a:p>
             <a:fld id="{11173057-E3FB-4AE4-9370-CCC1CF2B6FF4}" type="datetimeFigureOut">
               <a:rPr lang="zh-TW" altLang="en-US" smtClean="0"/>
-              <a:t>2023/2/18</a:t>
+              <a:t>2023/3/13</a:t>
             </a:fld>
             <a:endParaRPr lang="zh-TW" altLang="en-US"/>
           </a:p>
@@ -2400,7 +2400,7 @@
           <a:p>
             <a:fld id="{11173057-E3FB-4AE4-9370-CCC1CF2B6FF4}" type="datetimeFigureOut">
               <a:rPr lang="zh-TW" altLang="en-US" smtClean="0"/>
-              <a:t>2023/2/18</a:t>
+              <a:t>2023/3/13</a:t>
             </a:fld>
             <a:endParaRPr lang="zh-TW" altLang="en-US"/>
           </a:p>
@@ -2513,7 +2513,7 @@
           <a:p>
             <a:fld id="{11173057-E3FB-4AE4-9370-CCC1CF2B6FF4}" type="datetimeFigureOut">
               <a:rPr lang="zh-TW" altLang="en-US" smtClean="0"/>
-              <a:t>2023/2/18</a:t>
+              <a:t>2023/3/13</a:t>
             </a:fld>
             <a:endParaRPr lang="zh-TW" altLang="en-US"/>
           </a:p>
@@ -2824,7 +2824,7 @@
           <a:p>
             <a:fld id="{11173057-E3FB-4AE4-9370-CCC1CF2B6FF4}" type="datetimeFigureOut">
               <a:rPr lang="zh-TW" altLang="en-US" smtClean="0"/>
-              <a:t>2023/2/18</a:t>
+              <a:t>2023/3/13</a:t>
             </a:fld>
             <a:endParaRPr lang="zh-TW" altLang="en-US"/>
           </a:p>
@@ -3112,7 +3112,7 @@
           <a:p>
             <a:fld id="{11173057-E3FB-4AE4-9370-CCC1CF2B6FF4}" type="datetimeFigureOut">
               <a:rPr lang="zh-TW" altLang="en-US" smtClean="0"/>
-              <a:t>2023/2/18</a:t>
+              <a:t>2023/3/13</a:t>
             </a:fld>
             <a:endParaRPr lang="zh-TW" altLang="en-US"/>
           </a:p>
@@ -3353,7 +3353,7 @@
           <a:p>
             <a:fld id="{11173057-E3FB-4AE4-9370-CCC1CF2B6FF4}" type="datetimeFigureOut">
               <a:rPr lang="zh-TW" altLang="en-US" smtClean="0"/>
-              <a:t>2023/2/18</a:t>
+              <a:t>2023/3/13</a:t>
             </a:fld>
             <a:endParaRPr lang="zh-TW" altLang="en-US"/>
           </a:p>

</xml_diff>